<commit_message>
Add example to presentation
</commit_message>
<xml_diff>
--- a/reports/report_presentation.pptx
+++ b/reports/report_presentation.pptx
@@ -5,10 +5,10 @@
     <p:sldMasterId id="2147483648" r:id="rId4"/>
   </p:sldMasterIdLst>
   <p:notesMasterIdLst>
-    <p:notesMasterId r:id="rId25"/>
+    <p:notesMasterId r:id="rId29"/>
   </p:notesMasterIdLst>
   <p:handoutMasterIdLst>
-    <p:handoutMasterId r:id="rId26"/>
+    <p:handoutMasterId r:id="rId30"/>
   </p:handoutMasterIdLst>
   <p:sldIdLst>
     <p:sldId id="256" r:id="rId5"/>
@@ -19,18 +19,22 @@
     <p:sldId id="285" r:id="rId10"/>
     <p:sldId id="260" r:id="rId11"/>
     <p:sldId id="291" r:id="rId12"/>
-    <p:sldId id="289" r:id="rId13"/>
-    <p:sldId id="286" r:id="rId14"/>
-    <p:sldId id="290" r:id="rId15"/>
-    <p:sldId id="292" r:id="rId16"/>
-    <p:sldId id="287" r:id="rId17"/>
-    <p:sldId id="294" r:id="rId18"/>
-    <p:sldId id="262" r:id="rId19"/>
-    <p:sldId id="283" r:id="rId20"/>
-    <p:sldId id="264" r:id="rId21"/>
-    <p:sldId id="266" r:id="rId22"/>
-    <p:sldId id="284" r:id="rId23"/>
-    <p:sldId id="269" r:id="rId24"/>
+    <p:sldId id="295" r:id="rId13"/>
+    <p:sldId id="296" r:id="rId14"/>
+    <p:sldId id="297" r:id="rId15"/>
+    <p:sldId id="298" r:id="rId16"/>
+    <p:sldId id="289" r:id="rId17"/>
+    <p:sldId id="286" r:id="rId18"/>
+    <p:sldId id="290" r:id="rId19"/>
+    <p:sldId id="292" r:id="rId20"/>
+    <p:sldId id="287" r:id="rId21"/>
+    <p:sldId id="294" r:id="rId22"/>
+    <p:sldId id="262" r:id="rId23"/>
+    <p:sldId id="283" r:id="rId24"/>
+    <p:sldId id="264" r:id="rId25"/>
+    <p:sldId id="266" r:id="rId26"/>
+    <p:sldId id="284" r:id="rId27"/>
+    <p:sldId id="269" r:id="rId28"/>
   </p:sldIdLst>
   <p:sldSz cx="12192000" cy="6858000"/>
   <p:notesSz cx="6858000" cy="9144000"/>
@@ -554,7 +558,7 @@
 <file path=ppt/charts/chart1.xml><?xml version="1.0" encoding="utf-8"?>
 <c:chartSpace xmlns:c="http://schemas.openxmlformats.org/drawingml/2006/chart" xmlns:a="http://schemas.openxmlformats.org/drawingml/2006/main" xmlns:r="http://schemas.openxmlformats.org/officeDocument/2006/relationships" xmlns:c16r2="http://schemas.microsoft.com/office/drawing/2015/06/chart">
   <c:date1904 val="0"/>
-  <c:lang val="en-US"/>
+  <c:lang val="el-GR"/>
   <c:roundedCorners val="0"/>
   <mc:AlternateContent xmlns:mc="http://schemas.openxmlformats.org/markup-compatibility/2006">
     <mc:Choice xmlns:c14="http://schemas.microsoft.com/office/drawing/2007/8/2/chart" Requires="c14">
@@ -826,7 +830,7 @@
                 <a:cs typeface="+mn-cs"/>
               </a:defRPr>
             </a:pPr>
-            <a:endParaRPr lang="en-150"/>
+            <a:endParaRPr lang="el-GR"/>
           </a:p>
         </c:txPr>
         <c:crossAx val="1000041744"/>
@@ -868,7 +872,7 @@
                 <a:cs typeface="+mn-cs"/>
               </a:defRPr>
             </a:pPr>
-            <a:endParaRPr lang="en-150"/>
+            <a:endParaRPr lang="el-GR"/>
           </a:p>
         </c:txPr>
         <c:crossAx val="1000041416"/>
@@ -910,7 +914,7 @@
           <a:latin typeface="+mn-lt"/>
         </a:defRPr>
       </a:pPr>
-      <a:endParaRPr lang="en-150"/>
+      <a:endParaRPr lang="el-GR"/>
     </a:p>
   </c:txPr>
   <c:externalData r:id="rId3">
@@ -1556,7 +1560,7 @@
           <a:p>
             <a:fld id="{1CA5457B-CDAE-4DEB-AEC8-C82DE2312E37}" type="datetimeFigureOut">
               <a:rPr lang="en-US" smtClean="0"/>
-              <a:t>1/21/2023</a:t>
+              <a:t>1/22/2023</a:t>
             </a:fld>
             <a:endParaRPr lang="en-US" dirty="0"/>
           </a:p>
@@ -1733,7 +1737,7 @@
           <a:p>
             <a:fld id="{090B78EA-28CE-41D8-9043-90E391E5F567}" type="datetimeFigureOut">
               <a:rPr lang="en-US" noProof="0" smtClean="0"/>
-              <a:t>1/21/2023</a:t>
+              <a:t>1/22/2023</a:t>
             </a:fld>
             <a:endParaRPr lang="en-US" noProof="0" dirty="0"/>
           </a:p>
@@ -26900,10 +26904,44 @@
       </p:grpSpPr>
       <p:sp>
         <p:nvSpPr>
-          <p:cNvPr id="2" name="Slide Number Placeholder 1">
+          <p:cNvPr id="2" name="Τίτλος 1">
             <a:extLst>
               <a:ext uri="{FF2B5EF4-FFF2-40B4-BE49-F238E27FC236}">
-                <a16:creationId xmlns:a16="http://schemas.microsoft.com/office/drawing/2014/main" id="{ED5D82C7-8910-CEE9-A138-FEAA3F66FEC7}"/>
+                <a16:creationId xmlns:a16="http://schemas.microsoft.com/office/drawing/2014/main" id="{A6F23DA2-8C28-CC7D-B19C-5A54995DFB0A}"/>
+              </a:ext>
+            </a:extLst>
+          </p:cNvPr>
+          <p:cNvSpPr>
+            <a:spLocks noGrp="1"/>
+          </p:cNvSpPr>
+          <p:nvPr>
+            <p:ph type="title"/>
+          </p:nvPr>
+        </p:nvSpPr>
+        <p:spPr>
+          <a:xfrm>
+            <a:off x="444500" y="542925"/>
+            <a:ext cx="11214100" cy="535531"/>
+          </a:xfrm>
+        </p:spPr>
+        <p:txBody>
+          <a:bodyPr/>
+          <a:lstStyle/>
+          <a:p>
+            <a:r>
+              <a:rPr lang="en-US" dirty="0"/>
+              <a:t>Top 3 points example</a:t>
+            </a:r>
+            <a:endParaRPr lang="el-GR" dirty="0"/>
+          </a:p>
+        </p:txBody>
+      </p:sp>
+      <p:sp>
+        <p:nvSpPr>
+          <p:cNvPr id="3" name="Θέση αριθμού διαφάνειας 2">
+            <a:extLst>
+              <a:ext uri="{FF2B5EF4-FFF2-40B4-BE49-F238E27FC236}">
+                <a16:creationId xmlns:a16="http://schemas.microsoft.com/office/drawing/2014/main" id="{D641B237-C610-F2A4-99F9-5C44C21A7B66}"/>
               </a:ext>
             </a:extLst>
           </p:cNvPr>
@@ -26928,10 +26966,597 @@
           </a:p>
         </p:txBody>
       </p:sp>
+      <p:pic>
+        <p:nvPicPr>
+          <p:cNvPr id="9" name="Εικόνα 8">
+            <a:extLst>
+              <a:ext uri="{FF2B5EF4-FFF2-40B4-BE49-F238E27FC236}">
+                <a16:creationId xmlns:a16="http://schemas.microsoft.com/office/drawing/2014/main" id="{0D157B8C-BFA1-28D7-B5FE-ACD766EC772A}"/>
+              </a:ext>
+            </a:extLst>
+          </p:cNvPr>
+          <p:cNvPicPr>
+            <a:picLocks noChangeAspect="1"/>
+          </p:cNvPicPr>
+          <p:nvPr/>
+        </p:nvPicPr>
+        <p:blipFill>
+          <a:blip r:embed="rId2"/>
+          <a:srcRect/>
+          <a:stretch/>
+        </p:blipFill>
+        <p:spPr>
+          <a:xfrm>
+            <a:off x="444500" y="1350793"/>
+            <a:ext cx="6703357" cy="5433248"/>
+          </a:xfrm>
+          <a:prstGeom prst="rect">
+            <a:avLst/>
+          </a:prstGeom>
+        </p:spPr>
+      </p:pic>
+      <p:sp>
+        <p:nvSpPr>
+          <p:cNvPr id="10" name="TextBox 9">
+            <a:extLst>
+              <a:ext uri="{FF2B5EF4-FFF2-40B4-BE49-F238E27FC236}">
+                <a16:creationId xmlns:a16="http://schemas.microsoft.com/office/drawing/2014/main" id="{9CEF2B1F-6A04-E030-3B9B-D56E893BAF76}"/>
+              </a:ext>
+            </a:extLst>
+          </p:cNvPr>
+          <p:cNvSpPr txBox="1"/>
+          <p:nvPr/>
+        </p:nvSpPr>
+        <p:spPr>
+          <a:xfrm>
+            <a:off x="7496734" y="1350793"/>
+            <a:ext cx="4623548" cy="4803879"/>
+          </a:xfrm>
+          <a:prstGeom prst="rect">
+            <a:avLst/>
+          </a:prstGeom>
+          <a:noFill/>
+        </p:spPr>
+        <p:txBody>
+          <a:bodyPr wrap="square" rtlCol="0">
+            <a:spAutoFit/>
+          </a:bodyPr>
+          <a:lstStyle/>
+          <a:p>
+            <a:pPr marL="342900" lvl="0" indent="-342900" algn="just">
+              <a:spcBef>
+                <a:spcPts val="900"/>
+              </a:spcBef>
+              <a:spcAft>
+                <a:spcPts val="400"/>
+              </a:spcAft>
+              <a:buFont typeface="+mj-lt"/>
+              <a:buAutoNum type="arabicPeriod" startAt="6"/>
+            </a:pPr>
+            <a:r>
+              <a:rPr lang="en-US" sz="1400" b="0" dirty="0">
+                <a:solidFill>
+                  <a:schemeClr val="bg1"/>
+                </a:solidFill>
+                <a:effectLst/>
+                <a:ea typeface="Times New Roman" panose="02020603050405020304" pitchFamily="18" charset="0"/>
+              </a:rPr>
+              <a:t>Sort the </a:t>
+            </a:r>
+            <a:r>
+              <a:rPr lang="en-US" sz="1400" b="0" i="1" dirty="0">
+                <a:solidFill>
+                  <a:schemeClr val="accent1">
+                    <a:lumMod val="40000"/>
+                    <a:lumOff val="60000"/>
+                  </a:schemeClr>
+                </a:solidFill>
+                <a:effectLst/>
+                <a:ea typeface="Times New Roman" panose="02020603050405020304" pitchFamily="18" charset="0"/>
+              </a:rPr>
+              <a:t>candidate_points</a:t>
+            </a:r>
+            <a:r>
+              <a:rPr lang="en-US" sz="1400" b="0" dirty="0">
+                <a:solidFill>
+                  <a:schemeClr val="accent1">
+                    <a:lumMod val="40000"/>
+                    <a:lumOff val="60000"/>
+                  </a:schemeClr>
+                </a:solidFill>
+                <a:effectLst/>
+                <a:ea typeface="Times New Roman" panose="02020603050405020304" pitchFamily="18" charset="0"/>
+              </a:rPr>
+              <a:t> </a:t>
+            </a:r>
+            <a:r>
+              <a:rPr lang="en-US" sz="1400" b="0" dirty="0">
+                <a:solidFill>
+                  <a:schemeClr val="bg1"/>
+                </a:solidFill>
+                <a:effectLst/>
+                <a:ea typeface="Times New Roman" panose="02020603050405020304" pitchFamily="18" charset="0"/>
+              </a:rPr>
+              <a:t>list by the number of dominations in descending order</a:t>
+            </a:r>
+            <a:endParaRPr lang="el-GR" sz="1400" b="1" dirty="0">
+              <a:solidFill>
+                <a:schemeClr val="bg1"/>
+              </a:solidFill>
+              <a:effectLst/>
+              <a:ea typeface="Times New Roman" panose="02020603050405020304" pitchFamily="18" charset="0"/>
+            </a:endParaRPr>
+          </a:p>
+          <a:p>
+            <a:pPr marL="342900" lvl="0" indent="-342900" algn="just">
+              <a:spcBef>
+                <a:spcPts val="900"/>
+              </a:spcBef>
+              <a:spcAft>
+                <a:spcPts val="400"/>
+              </a:spcAft>
+              <a:buFont typeface="+mj-lt"/>
+              <a:buAutoNum type="arabicPeriod" startAt="6"/>
+            </a:pPr>
+            <a:r>
+              <a:rPr lang="en-US" sz="1400" b="0" dirty="0">
+                <a:solidFill>
+                  <a:schemeClr val="bg1"/>
+                </a:solidFill>
+                <a:effectLst/>
+                <a:ea typeface="Times New Roman" panose="02020603050405020304" pitchFamily="18" charset="0"/>
+              </a:rPr>
+              <a:t>Get the first element </a:t>
+            </a:r>
+            <a:r>
+              <a:rPr lang="en-US" sz="1400" b="0" i="1" dirty="0">
+                <a:solidFill>
+                  <a:schemeClr val="bg1"/>
+                </a:solidFill>
+                <a:effectLst/>
+                <a:ea typeface="Times New Roman" panose="02020603050405020304" pitchFamily="18" charset="0"/>
+              </a:rPr>
+              <a:t>top_point</a:t>
+            </a:r>
+            <a:r>
+              <a:rPr lang="en-US" sz="1400" b="0" dirty="0">
+                <a:solidFill>
+                  <a:schemeClr val="bg1"/>
+                </a:solidFill>
+                <a:effectLst/>
+                <a:ea typeface="Times New Roman" panose="02020603050405020304" pitchFamily="18" charset="0"/>
+              </a:rPr>
+              <a:t> of the </a:t>
+            </a:r>
+            <a:r>
+              <a:rPr lang="en-US" sz="1400" b="0" i="1" dirty="0">
+                <a:solidFill>
+                  <a:schemeClr val="accent1">
+                    <a:lumMod val="40000"/>
+                    <a:lumOff val="60000"/>
+                  </a:schemeClr>
+                </a:solidFill>
+                <a:effectLst/>
+                <a:ea typeface="Times New Roman" panose="02020603050405020304" pitchFamily="18" charset="0"/>
+              </a:rPr>
+              <a:t>candidate_points</a:t>
+            </a:r>
+            <a:r>
+              <a:rPr lang="en-US" sz="1400" b="0" dirty="0">
+                <a:solidFill>
+                  <a:schemeClr val="accent1">
+                    <a:lumMod val="40000"/>
+                    <a:lumOff val="60000"/>
+                  </a:schemeClr>
+                </a:solidFill>
+                <a:effectLst/>
+                <a:ea typeface="Times New Roman" panose="02020603050405020304" pitchFamily="18" charset="0"/>
+              </a:rPr>
+              <a:t> </a:t>
+            </a:r>
+            <a:r>
+              <a:rPr lang="en-US" sz="1400" b="0" dirty="0">
+                <a:solidFill>
+                  <a:schemeClr val="bg1"/>
+                </a:solidFill>
+                <a:effectLst/>
+                <a:ea typeface="Times New Roman" panose="02020603050405020304" pitchFamily="18" charset="0"/>
+              </a:rPr>
+              <a:t>list, add it to the </a:t>
+            </a:r>
+            <a:r>
+              <a:rPr lang="en-US" sz="1400" b="0" i="1" dirty="0">
+                <a:solidFill>
+                  <a:srgbClr val="92D050"/>
+                </a:solidFill>
+                <a:effectLst/>
+                <a:ea typeface="Times New Roman" panose="02020603050405020304" pitchFamily="18" charset="0"/>
+              </a:rPr>
+              <a:t>top_points</a:t>
+            </a:r>
+            <a:r>
+              <a:rPr lang="en-US" sz="1400" b="0" dirty="0">
+                <a:solidFill>
+                  <a:srgbClr val="92D050"/>
+                </a:solidFill>
+                <a:effectLst/>
+                <a:ea typeface="Times New Roman" panose="02020603050405020304" pitchFamily="18" charset="0"/>
+              </a:rPr>
+              <a:t> </a:t>
+            </a:r>
+            <a:r>
+              <a:rPr lang="en-US" sz="1400" b="0" dirty="0">
+                <a:solidFill>
+                  <a:schemeClr val="bg1"/>
+                </a:solidFill>
+                <a:effectLst/>
+                <a:ea typeface="Times New Roman" panose="02020603050405020304" pitchFamily="18" charset="0"/>
+              </a:rPr>
+              <a:t>list and remove it from the dataset </a:t>
+            </a:r>
+            <a:r>
+              <a:rPr lang="en-US" sz="1400" b="0" i="1" dirty="0">
+                <a:solidFill>
+                  <a:schemeClr val="bg1"/>
+                </a:solidFill>
+                <a:effectLst/>
+                <a:ea typeface="Times New Roman" panose="02020603050405020304" pitchFamily="18" charset="0"/>
+              </a:rPr>
+              <a:t>points</a:t>
+            </a:r>
+            <a:endParaRPr lang="el-GR" sz="1400" b="1" dirty="0">
+              <a:solidFill>
+                <a:schemeClr val="bg1"/>
+              </a:solidFill>
+              <a:effectLst/>
+              <a:ea typeface="Times New Roman" panose="02020603050405020304" pitchFamily="18" charset="0"/>
+            </a:endParaRPr>
+          </a:p>
+          <a:p>
+            <a:pPr marL="342900" lvl="0" indent="-342900" algn="just">
+              <a:spcBef>
+                <a:spcPts val="900"/>
+              </a:spcBef>
+              <a:spcAft>
+                <a:spcPts val="400"/>
+              </a:spcAft>
+              <a:buFont typeface="+mj-lt"/>
+              <a:buAutoNum type="arabicPeriod" startAt="6"/>
+            </a:pPr>
+            <a:r>
+              <a:rPr lang="en-US" sz="1400" b="0" dirty="0">
+                <a:solidFill>
+                  <a:schemeClr val="bg1"/>
+                </a:solidFill>
+                <a:effectLst/>
+                <a:ea typeface="Times New Roman" panose="02020603050405020304" pitchFamily="18" charset="0"/>
+              </a:rPr>
+              <a:t>Create a list </a:t>
+            </a:r>
+            <a:r>
+              <a:rPr lang="en-US" sz="1400" b="0" i="1" dirty="0">
+                <a:solidFill>
+                  <a:schemeClr val="accent6">
+                    <a:lumMod val="60000"/>
+                    <a:lumOff val="40000"/>
+                  </a:schemeClr>
+                </a:solidFill>
+                <a:effectLst/>
+                <a:ea typeface="Times New Roman" panose="02020603050405020304" pitchFamily="18" charset="0"/>
+              </a:rPr>
+              <a:t>dominated_points (red rectangle)</a:t>
+            </a:r>
+            <a:r>
+              <a:rPr lang="en-US" sz="1400" b="0" dirty="0">
+                <a:solidFill>
+                  <a:schemeClr val="accent6">
+                    <a:lumMod val="60000"/>
+                    <a:lumOff val="40000"/>
+                  </a:schemeClr>
+                </a:solidFill>
+                <a:effectLst/>
+                <a:ea typeface="Times New Roman" panose="02020603050405020304" pitchFamily="18" charset="0"/>
+              </a:rPr>
+              <a:t> </a:t>
+            </a:r>
+            <a:r>
+              <a:rPr lang="en-US" sz="1400" b="0" dirty="0">
+                <a:solidFill>
+                  <a:schemeClr val="bg1"/>
+                </a:solidFill>
+                <a:effectLst/>
+                <a:ea typeface="Times New Roman" panose="02020603050405020304" pitchFamily="18" charset="0"/>
+              </a:rPr>
+              <a:t>that contains all the points dominated by the </a:t>
+            </a:r>
+            <a:r>
+              <a:rPr lang="en-US" sz="1400" b="0" i="1" dirty="0">
+                <a:solidFill>
+                  <a:schemeClr val="bg1"/>
+                </a:solidFill>
+                <a:effectLst/>
+                <a:ea typeface="Times New Roman" panose="02020603050405020304" pitchFamily="18" charset="0"/>
+              </a:rPr>
+              <a:t>top_point</a:t>
+            </a:r>
+            <a:r>
+              <a:rPr lang="en-US" sz="1400" b="0" dirty="0">
+                <a:solidFill>
+                  <a:schemeClr val="bg1"/>
+                </a:solidFill>
+                <a:effectLst/>
+                <a:ea typeface="Times New Roman" panose="02020603050405020304" pitchFamily="18" charset="0"/>
+              </a:rPr>
+              <a:t> excluding itself and the points in the list </a:t>
+            </a:r>
+            <a:r>
+              <a:rPr lang="en-US" sz="1400" b="0" i="1" dirty="0">
+                <a:solidFill>
+                  <a:srgbClr val="92D050"/>
+                </a:solidFill>
+                <a:effectLst/>
+                <a:ea typeface="Times New Roman" panose="02020603050405020304" pitchFamily="18" charset="0"/>
+              </a:rPr>
+              <a:t>top_points</a:t>
+            </a:r>
+            <a:r>
+              <a:rPr lang="en-US" sz="1400" b="0" dirty="0">
+                <a:solidFill>
+                  <a:schemeClr val="bg1"/>
+                </a:solidFill>
+                <a:effectLst/>
+                <a:ea typeface="Times New Roman" panose="02020603050405020304" pitchFamily="18" charset="0"/>
+              </a:rPr>
+              <a:t>.</a:t>
+            </a:r>
+            <a:endParaRPr lang="el-GR" sz="1400" b="1" dirty="0">
+              <a:solidFill>
+                <a:schemeClr val="bg1"/>
+              </a:solidFill>
+              <a:effectLst/>
+              <a:ea typeface="Times New Roman" panose="02020603050405020304" pitchFamily="18" charset="0"/>
+            </a:endParaRPr>
+          </a:p>
+          <a:p>
+            <a:pPr marL="342900" lvl="0" indent="-342900" algn="just">
+              <a:spcBef>
+                <a:spcPts val="900"/>
+              </a:spcBef>
+              <a:spcAft>
+                <a:spcPts val="400"/>
+              </a:spcAft>
+              <a:buFont typeface="+mj-lt"/>
+              <a:buAutoNum type="arabicPeriod" startAt="6"/>
+            </a:pPr>
+            <a:r>
+              <a:rPr lang="en-US" sz="1400" b="0" dirty="0">
+                <a:solidFill>
+                  <a:schemeClr val="bg1"/>
+                </a:solidFill>
+                <a:effectLst/>
+                <a:ea typeface="Times New Roman" panose="02020603050405020304" pitchFamily="18" charset="0"/>
+              </a:rPr>
+              <a:t>Compute the skyline points of the </a:t>
+            </a:r>
+            <a:r>
+              <a:rPr lang="en-US" sz="1400" b="0" i="1" dirty="0">
+                <a:solidFill>
+                  <a:schemeClr val="accent6">
+                    <a:lumMod val="60000"/>
+                    <a:lumOff val="40000"/>
+                  </a:schemeClr>
+                </a:solidFill>
+                <a:effectLst/>
+                <a:ea typeface="Times New Roman" panose="02020603050405020304" pitchFamily="18" charset="0"/>
+              </a:rPr>
+              <a:t>dominated_points</a:t>
+            </a:r>
+            <a:r>
+              <a:rPr lang="en-US" sz="1400" b="0" dirty="0">
+                <a:solidFill>
+                  <a:schemeClr val="accent6">
+                    <a:lumMod val="60000"/>
+                    <a:lumOff val="40000"/>
+                  </a:schemeClr>
+                </a:solidFill>
+                <a:effectLst/>
+                <a:ea typeface="Times New Roman" panose="02020603050405020304" pitchFamily="18" charset="0"/>
+              </a:rPr>
+              <a:t> </a:t>
+            </a:r>
+            <a:r>
+              <a:rPr lang="en-US" sz="1400" b="0" dirty="0">
+                <a:solidFill>
+                  <a:schemeClr val="bg1"/>
+                </a:solidFill>
+                <a:effectLst/>
+                <a:ea typeface="Times New Roman" panose="02020603050405020304" pitchFamily="18" charset="0"/>
+              </a:rPr>
+              <a:t>list, using the algorithm described on task 1 and count the number of dominations for each one of them</a:t>
+            </a:r>
+            <a:endParaRPr lang="el-GR" sz="1400" b="1" dirty="0">
+              <a:solidFill>
+                <a:schemeClr val="bg1"/>
+              </a:solidFill>
+              <a:effectLst/>
+              <a:ea typeface="Times New Roman" panose="02020603050405020304" pitchFamily="18" charset="0"/>
+            </a:endParaRPr>
+          </a:p>
+          <a:p>
+            <a:pPr marL="342900" lvl="0" indent="-342900" algn="just">
+              <a:spcBef>
+                <a:spcPts val="900"/>
+              </a:spcBef>
+              <a:spcAft>
+                <a:spcPts val="400"/>
+              </a:spcAft>
+              <a:buFont typeface="+mj-lt"/>
+              <a:buAutoNum type="arabicPeriod" startAt="6"/>
+            </a:pPr>
+            <a:r>
+              <a:rPr lang="en-US" sz="1400" b="0" dirty="0">
+                <a:solidFill>
+                  <a:schemeClr val="bg1"/>
+                </a:solidFill>
+                <a:effectLst/>
+                <a:ea typeface="Times New Roman" panose="02020603050405020304" pitchFamily="18" charset="0"/>
+              </a:rPr>
+              <a:t>Add the skylines points of the </a:t>
+            </a:r>
+            <a:r>
+              <a:rPr lang="en-US" sz="1400" b="0" i="1" dirty="0">
+                <a:solidFill>
+                  <a:schemeClr val="accent6">
+                    <a:lumMod val="60000"/>
+                    <a:lumOff val="40000"/>
+                  </a:schemeClr>
+                </a:solidFill>
+                <a:effectLst/>
+                <a:ea typeface="Times New Roman" panose="02020603050405020304" pitchFamily="18" charset="0"/>
+              </a:rPr>
+              <a:t>dominated_points </a:t>
+            </a:r>
+            <a:r>
+              <a:rPr lang="en-US" sz="1400" b="0" dirty="0">
+                <a:solidFill>
+                  <a:schemeClr val="bg1"/>
+                </a:solidFill>
+                <a:effectLst/>
+                <a:ea typeface="Times New Roman" panose="02020603050405020304" pitchFamily="18" charset="0"/>
+              </a:rPr>
+              <a:t>list along with their dominations in the </a:t>
+            </a:r>
+            <a:r>
+              <a:rPr lang="en-US" sz="1400" b="0" i="1" dirty="0">
+                <a:solidFill>
+                  <a:schemeClr val="accent1">
+                    <a:lumMod val="40000"/>
+                    <a:lumOff val="60000"/>
+                  </a:schemeClr>
+                </a:solidFill>
+                <a:effectLst/>
+                <a:ea typeface="Times New Roman" panose="02020603050405020304" pitchFamily="18" charset="0"/>
+              </a:rPr>
+              <a:t>candidate_points</a:t>
+            </a:r>
+            <a:r>
+              <a:rPr lang="en-US" sz="1400" b="0" dirty="0">
+                <a:solidFill>
+                  <a:schemeClr val="accent1">
+                    <a:lumMod val="40000"/>
+                    <a:lumOff val="60000"/>
+                  </a:schemeClr>
+                </a:solidFill>
+                <a:effectLst/>
+                <a:ea typeface="Times New Roman" panose="02020603050405020304" pitchFamily="18" charset="0"/>
+              </a:rPr>
+              <a:t> </a:t>
+            </a:r>
+            <a:r>
+              <a:rPr lang="en-US" sz="1400" b="0" dirty="0">
+                <a:solidFill>
+                  <a:schemeClr val="bg1"/>
+                </a:solidFill>
+                <a:effectLst/>
+                <a:ea typeface="Times New Roman" panose="02020603050405020304" pitchFamily="18" charset="0"/>
+              </a:rPr>
+              <a:t>list</a:t>
+            </a:r>
+          </a:p>
+          <a:p>
+            <a:pPr marL="342900" indent="-342900" algn="just">
+              <a:spcBef>
+                <a:spcPts val="900"/>
+              </a:spcBef>
+              <a:spcAft>
+                <a:spcPts val="400"/>
+              </a:spcAft>
+              <a:buFont typeface="+mj-lt"/>
+              <a:buAutoNum type="arabicPeriod" startAt="6"/>
+            </a:pPr>
+            <a:r>
+              <a:rPr lang="en-US" sz="1400" b="0" dirty="0">
+                <a:solidFill>
+                  <a:schemeClr val="bg1"/>
+                </a:solidFill>
+                <a:effectLst/>
+                <a:ea typeface="Times New Roman" panose="02020603050405020304" pitchFamily="18" charset="0"/>
+              </a:rPr>
+              <a:t>If the length of the </a:t>
+            </a:r>
+            <a:r>
+              <a:rPr lang="en-US" sz="1400" b="0" i="1" dirty="0">
+                <a:solidFill>
+                  <a:schemeClr val="accent1">
+                    <a:lumMod val="40000"/>
+                    <a:lumOff val="60000"/>
+                  </a:schemeClr>
+                </a:solidFill>
+                <a:effectLst/>
+                <a:ea typeface="Times New Roman" panose="02020603050405020304" pitchFamily="18" charset="0"/>
+              </a:rPr>
+              <a:t>candidate_points</a:t>
+            </a:r>
+            <a:r>
+              <a:rPr lang="en-US" sz="1400" b="0" dirty="0">
+                <a:solidFill>
+                  <a:schemeClr val="accent1">
+                    <a:lumMod val="40000"/>
+                    <a:lumOff val="60000"/>
+                  </a:schemeClr>
+                </a:solidFill>
+                <a:effectLst/>
+                <a:ea typeface="Times New Roman" panose="02020603050405020304" pitchFamily="18" charset="0"/>
+              </a:rPr>
+              <a:t> </a:t>
+            </a:r>
+            <a:r>
+              <a:rPr lang="en-US" sz="1400" b="0" dirty="0">
+                <a:solidFill>
+                  <a:schemeClr val="bg1"/>
+                </a:solidFill>
+                <a:effectLst/>
+                <a:ea typeface="Times New Roman" panose="02020603050405020304" pitchFamily="18" charset="0"/>
+              </a:rPr>
+              <a:t>list is zero or we got the top k points then return </a:t>
+            </a:r>
+            <a:r>
+              <a:rPr lang="en-US" sz="1400" b="0" i="1" dirty="0">
+                <a:solidFill>
+                  <a:srgbClr val="92D050"/>
+                </a:solidFill>
+                <a:effectLst/>
+                <a:ea typeface="Times New Roman" panose="02020603050405020304" pitchFamily="18" charset="0"/>
+              </a:rPr>
+              <a:t>top_points</a:t>
+            </a:r>
+            <a:r>
+              <a:rPr lang="en-US" sz="1400" b="0" dirty="0">
+                <a:solidFill>
+                  <a:srgbClr val="92D050"/>
+                </a:solidFill>
+                <a:effectLst/>
+                <a:ea typeface="Times New Roman" panose="02020603050405020304" pitchFamily="18" charset="0"/>
+              </a:rPr>
+              <a:t> </a:t>
+            </a:r>
+            <a:r>
+              <a:rPr lang="en-US" sz="1400" b="0" dirty="0">
+                <a:solidFill>
+                  <a:schemeClr val="bg1"/>
+                </a:solidFill>
+                <a:effectLst/>
+                <a:ea typeface="Times New Roman" panose="02020603050405020304" pitchFamily="18" charset="0"/>
+              </a:rPr>
+              <a:t>list else go to step 6</a:t>
+            </a:r>
+          </a:p>
+        </p:txBody>
+      </p:sp>
     </p:spTree>
     <p:extLst>
       <p:ext uri="{BB962C8B-B14F-4D97-AF65-F5344CB8AC3E}">
-        <p14:creationId xmlns:p14="http://schemas.microsoft.com/office/powerpoint/2010/main" val="1592003877"/>
+        <p14:creationId xmlns:p14="http://schemas.microsoft.com/office/powerpoint/2010/main" val="1382447623"/>
       </p:ext>
     </p:extLst>
   </p:cSld>
@@ -26960,10 +27585,10 @@
       </p:grpSpPr>
       <p:sp>
         <p:nvSpPr>
-          <p:cNvPr id="4" name="Title 3">
+          <p:cNvPr id="2" name="Τίτλος 1">
             <a:extLst>
               <a:ext uri="{FF2B5EF4-FFF2-40B4-BE49-F238E27FC236}">
-                <a16:creationId xmlns:a16="http://schemas.microsoft.com/office/drawing/2014/main" id="{BD179B88-D43C-4A31-9A52-3498E9430782}"/>
+                <a16:creationId xmlns:a16="http://schemas.microsoft.com/office/drawing/2014/main" id="{A6F23DA2-8C28-CC7D-B19C-5A54995DFB0A}"/>
               </a:ext>
             </a:extLst>
           </p:cNvPr>
@@ -26974,31 +27599,30 @@
             <p:ph type="title"/>
           </p:nvPr>
         </p:nvSpPr>
-        <p:spPr/>
+        <p:spPr>
+          <a:xfrm>
+            <a:off x="444500" y="542925"/>
+            <a:ext cx="11214100" cy="535531"/>
+          </a:xfrm>
+        </p:spPr>
         <p:txBody>
-          <a:bodyPr>
-            <a:noAutofit/>
-          </a:bodyPr>
+          <a:bodyPr/>
           <a:lstStyle/>
           <a:p>
             <a:r>
-              <a:rPr lang="en-US" i="1" dirty="0"/>
-              <a:t>Top-k </a:t>
+              <a:rPr lang="en-US" dirty="0"/>
+              <a:t>Top 3 points example</a:t>
             </a:r>
-            <a:r>
-              <a:rPr lang="en-US" dirty="0"/>
-              <a:t>skyline domination query</a:t>
-            </a:r>
-            <a:endParaRPr lang="en-US" i="1" dirty="0"/>
+            <a:endParaRPr lang="el-GR" dirty="0"/>
           </a:p>
         </p:txBody>
       </p:sp>
       <p:sp>
         <p:nvSpPr>
-          <p:cNvPr id="2" name="Slide Number Placeholder 1">
+          <p:cNvPr id="3" name="Θέση αριθμού διαφάνειας 2">
             <a:extLst>
               <a:ext uri="{FF2B5EF4-FFF2-40B4-BE49-F238E27FC236}">
-                <a16:creationId xmlns:a16="http://schemas.microsoft.com/office/drawing/2014/main" id="{8B065C75-272B-4BB5-BA23-D80E8654D621}"/>
+                <a16:creationId xmlns:a16="http://schemas.microsoft.com/office/drawing/2014/main" id="{D641B237-C610-F2A4-99F9-5C44C21A7B66}"/>
               </a:ext>
             </a:extLst>
           </p:cNvPr>
@@ -27015,36 +27639,636 @@
           <a:lstStyle/>
           <a:p>
             <a:fld id="{C263D6C4-4840-40CC-AC84-17E24B3B7BDE}" type="slidenum">
-              <a:rPr lang="en-US" smtClean="0"/>
+              <a:rPr lang="en-US" noProof="0" smtClean="0"/>
               <a:pPr/>
               <a:t>11</a:t>
             </a:fld>
-            <a:endParaRPr lang="en-US" dirty="0"/>
+            <a:endParaRPr lang="en-US" noProof="0" dirty="0"/>
+          </a:p>
+        </p:txBody>
+      </p:sp>
+      <p:pic>
+        <p:nvPicPr>
+          <p:cNvPr id="9" name="Εικόνα 8">
+            <a:extLst>
+              <a:ext uri="{FF2B5EF4-FFF2-40B4-BE49-F238E27FC236}">
+                <a16:creationId xmlns:a16="http://schemas.microsoft.com/office/drawing/2014/main" id="{0D157B8C-BFA1-28D7-B5FE-ACD766EC772A}"/>
+              </a:ext>
+            </a:extLst>
+          </p:cNvPr>
+          <p:cNvPicPr>
+            <a:picLocks noChangeAspect="1"/>
+          </p:cNvPicPr>
+          <p:nvPr/>
+        </p:nvPicPr>
+        <p:blipFill>
+          <a:blip r:embed="rId2"/>
+          <a:srcRect/>
+          <a:stretch/>
+        </p:blipFill>
+        <p:spPr>
+          <a:xfrm>
+            <a:off x="444500" y="1350793"/>
+            <a:ext cx="6703357" cy="5433247"/>
+          </a:xfrm>
+          <a:prstGeom prst="rect">
+            <a:avLst/>
+          </a:prstGeom>
+        </p:spPr>
+      </p:pic>
+      <p:sp>
+        <p:nvSpPr>
+          <p:cNvPr id="10" name="TextBox 9">
+            <a:extLst>
+              <a:ext uri="{FF2B5EF4-FFF2-40B4-BE49-F238E27FC236}">
+                <a16:creationId xmlns:a16="http://schemas.microsoft.com/office/drawing/2014/main" id="{9CEF2B1F-6A04-E030-3B9B-D56E893BAF76}"/>
+              </a:ext>
+            </a:extLst>
+          </p:cNvPr>
+          <p:cNvSpPr txBox="1"/>
+          <p:nvPr/>
+        </p:nvSpPr>
+        <p:spPr>
+          <a:xfrm>
+            <a:off x="7496734" y="1350793"/>
+            <a:ext cx="4623548" cy="5186035"/>
+          </a:xfrm>
+          <a:prstGeom prst="rect">
+            <a:avLst/>
+          </a:prstGeom>
+          <a:noFill/>
+        </p:spPr>
+        <p:txBody>
+          <a:bodyPr wrap="square" rtlCol="0">
+            <a:spAutoFit/>
+          </a:bodyPr>
+          <a:lstStyle/>
+          <a:p>
+            <a:pPr marL="342900" lvl="0" indent="-342900" algn="just">
+              <a:spcBef>
+                <a:spcPts val="900"/>
+              </a:spcBef>
+              <a:spcAft>
+                <a:spcPts val="400"/>
+              </a:spcAft>
+              <a:buFont typeface="+mj-lt"/>
+              <a:buAutoNum type="arabicPeriod" startAt="6"/>
+            </a:pPr>
+            <a:r>
+              <a:rPr lang="en-US" sz="1400" b="0" dirty="0">
+                <a:solidFill>
+                  <a:schemeClr val="bg1"/>
+                </a:solidFill>
+                <a:effectLst/>
+                <a:ea typeface="Times New Roman" panose="02020603050405020304" pitchFamily="18" charset="0"/>
+              </a:rPr>
+              <a:t>Sort the </a:t>
+            </a:r>
+            <a:r>
+              <a:rPr lang="en-US" sz="1400" b="0" i="1" dirty="0">
+                <a:solidFill>
+                  <a:schemeClr val="accent1">
+                    <a:lumMod val="40000"/>
+                    <a:lumOff val="60000"/>
+                  </a:schemeClr>
+                </a:solidFill>
+                <a:effectLst/>
+                <a:ea typeface="Times New Roman" panose="02020603050405020304" pitchFamily="18" charset="0"/>
+              </a:rPr>
+              <a:t>candidate_points</a:t>
+            </a:r>
+            <a:r>
+              <a:rPr lang="en-US" sz="1400" b="0" dirty="0">
+                <a:solidFill>
+                  <a:schemeClr val="accent1">
+                    <a:lumMod val="40000"/>
+                    <a:lumOff val="60000"/>
+                  </a:schemeClr>
+                </a:solidFill>
+                <a:effectLst/>
+                <a:ea typeface="Times New Roman" panose="02020603050405020304" pitchFamily="18" charset="0"/>
+              </a:rPr>
+              <a:t> </a:t>
+            </a:r>
+            <a:r>
+              <a:rPr lang="en-US" sz="1400" b="0" dirty="0">
+                <a:solidFill>
+                  <a:schemeClr val="bg1"/>
+                </a:solidFill>
+                <a:effectLst/>
+                <a:ea typeface="Times New Roman" panose="02020603050405020304" pitchFamily="18" charset="0"/>
+              </a:rPr>
+              <a:t>list by the number of dominations in descending order</a:t>
+            </a:r>
+            <a:endParaRPr lang="el-GR" sz="1400" b="1" dirty="0">
+              <a:solidFill>
+                <a:schemeClr val="bg1"/>
+              </a:solidFill>
+              <a:effectLst/>
+              <a:ea typeface="Times New Roman" panose="02020603050405020304" pitchFamily="18" charset="0"/>
+            </a:endParaRPr>
+          </a:p>
+          <a:p>
+            <a:pPr marL="342900" lvl="0" indent="-342900" algn="just">
+              <a:spcBef>
+                <a:spcPts val="900"/>
+              </a:spcBef>
+              <a:spcAft>
+                <a:spcPts val="400"/>
+              </a:spcAft>
+              <a:buFont typeface="+mj-lt"/>
+              <a:buAutoNum type="arabicPeriod" startAt="6"/>
+            </a:pPr>
+            <a:r>
+              <a:rPr lang="en-US" sz="1400" b="0" dirty="0">
+                <a:solidFill>
+                  <a:schemeClr val="bg1"/>
+                </a:solidFill>
+                <a:effectLst/>
+                <a:ea typeface="Times New Roman" panose="02020603050405020304" pitchFamily="18" charset="0"/>
+              </a:rPr>
+              <a:t>Get the first element </a:t>
+            </a:r>
+            <a:r>
+              <a:rPr lang="en-US" sz="1400" b="0" i="1" dirty="0">
+                <a:solidFill>
+                  <a:schemeClr val="bg1"/>
+                </a:solidFill>
+                <a:effectLst/>
+                <a:ea typeface="Times New Roman" panose="02020603050405020304" pitchFamily="18" charset="0"/>
+              </a:rPr>
+              <a:t>top_point</a:t>
+            </a:r>
+            <a:r>
+              <a:rPr lang="en-US" sz="1400" b="0" dirty="0">
+                <a:solidFill>
+                  <a:schemeClr val="bg1"/>
+                </a:solidFill>
+                <a:effectLst/>
+                <a:ea typeface="Times New Roman" panose="02020603050405020304" pitchFamily="18" charset="0"/>
+              </a:rPr>
+              <a:t> of the </a:t>
+            </a:r>
+            <a:r>
+              <a:rPr lang="en-US" sz="1400" b="0" i="1" dirty="0">
+                <a:solidFill>
+                  <a:schemeClr val="accent1">
+                    <a:lumMod val="40000"/>
+                    <a:lumOff val="60000"/>
+                  </a:schemeClr>
+                </a:solidFill>
+                <a:effectLst/>
+                <a:ea typeface="Times New Roman" panose="02020603050405020304" pitchFamily="18" charset="0"/>
+              </a:rPr>
+              <a:t>candidate_points</a:t>
+            </a:r>
+            <a:r>
+              <a:rPr lang="en-US" sz="1400" b="0" dirty="0">
+                <a:solidFill>
+                  <a:schemeClr val="accent1">
+                    <a:lumMod val="40000"/>
+                    <a:lumOff val="60000"/>
+                  </a:schemeClr>
+                </a:solidFill>
+                <a:effectLst/>
+                <a:ea typeface="Times New Roman" panose="02020603050405020304" pitchFamily="18" charset="0"/>
+              </a:rPr>
+              <a:t> </a:t>
+            </a:r>
+            <a:r>
+              <a:rPr lang="en-US" sz="1400" b="0" dirty="0">
+                <a:solidFill>
+                  <a:schemeClr val="bg1"/>
+                </a:solidFill>
+                <a:effectLst/>
+                <a:ea typeface="Times New Roman" panose="02020603050405020304" pitchFamily="18" charset="0"/>
+              </a:rPr>
+              <a:t>list, add it to the </a:t>
+            </a:r>
+            <a:r>
+              <a:rPr lang="en-US" sz="1400" b="0" i="1" dirty="0">
+                <a:solidFill>
+                  <a:srgbClr val="92D050"/>
+                </a:solidFill>
+                <a:effectLst/>
+                <a:ea typeface="Times New Roman" panose="02020603050405020304" pitchFamily="18" charset="0"/>
+              </a:rPr>
+              <a:t>top_points</a:t>
+            </a:r>
+            <a:r>
+              <a:rPr lang="en-US" sz="1400" b="0" dirty="0">
+                <a:solidFill>
+                  <a:srgbClr val="92D050"/>
+                </a:solidFill>
+                <a:effectLst/>
+                <a:ea typeface="Times New Roman" panose="02020603050405020304" pitchFamily="18" charset="0"/>
+              </a:rPr>
+              <a:t> </a:t>
+            </a:r>
+            <a:r>
+              <a:rPr lang="en-US" sz="1400" b="0" dirty="0">
+                <a:solidFill>
+                  <a:schemeClr val="bg1"/>
+                </a:solidFill>
+                <a:effectLst/>
+                <a:ea typeface="Times New Roman" panose="02020603050405020304" pitchFamily="18" charset="0"/>
+              </a:rPr>
+              <a:t>list and remove it from the dataset </a:t>
+            </a:r>
+            <a:r>
+              <a:rPr lang="en-US" sz="1400" b="0" i="1" dirty="0">
+                <a:solidFill>
+                  <a:schemeClr val="bg1"/>
+                </a:solidFill>
+                <a:effectLst/>
+                <a:ea typeface="Times New Roman" panose="02020603050405020304" pitchFamily="18" charset="0"/>
+              </a:rPr>
+              <a:t>points</a:t>
+            </a:r>
+            <a:endParaRPr lang="el-GR" sz="1400" b="1" dirty="0">
+              <a:solidFill>
+                <a:schemeClr val="bg1"/>
+              </a:solidFill>
+              <a:effectLst/>
+              <a:ea typeface="Times New Roman" panose="02020603050405020304" pitchFamily="18" charset="0"/>
+            </a:endParaRPr>
+          </a:p>
+          <a:p>
+            <a:pPr marL="342900" lvl="0" indent="-342900" algn="just">
+              <a:spcBef>
+                <a:spcPts val="900"/>
+              </a:spcBef>
+              <a:spcAft>
+                <a:spcPts val="400"/>
+              </a:spcAft>
+              <a:buFont typeface="+mj-lt"/>
+              <a:buAutoNum type="arabicPeriod" startAt="6"/>
+            </a:pPr>
+            <a:r>
+              <a:rPr lang="en-US" sz="1400" b="0" dirty="0">
+                <a:solidFill>
+                  <a:schemeClr val="bg1"/>
+                </a:solidFill>
+                <a:effectLst/>
+                <a:ea typeface="Times New Roman" panose="02020603050405020304" pitchFamily="18" charset="0"/>
+              </a:rPr>
+              <a:t>Create a list </a:t>
+            </a:r>
+            <a:r>
+              <a:rPr lang="en-US" sz="1400" b="0" i="1" dirty="0">
+                <a:solidFill>
+                  <a:schemeClr val="accent6">
+                    <a:lumMod val="60000"/>
+                    <a:lumOff val="40000"/>
+                  </a:schemeClr>
+                </a:solidFill>
+                <a:effectLst/>
+                <a:ea typeface="Times New Roman" panose="02020603050405020304" pitchFamily="18" charset="0"/>
+              </a:rPr>
+              <a:t>dominated_points (red rectangle)</a:t>
+            </a:r>
+            <a:r>
+              <a:rPr lang="en-US" sz="1400" b="0" dirty="0">
+                <a:solidFill>
+                  <a:schemeClr val="accent6">
+                    <a:lumMod val="60000"/>
+                    <a:lumOff val="40000"/>
+                  </a:schemeClr>
+                </a:solidFill>
+                <a:effectLst/>
+                <a:ea typeface="Times New Roman" panose="02020603050405020304" pitchFamily="18" charset="0"/>
+              </a:rPr>
+              <a:t> </a:t>
+            </a:r>
+            <a:r>
+              <a:rPr lang="en-US" sz="1400" b="0" dirty="0">
+                <a:solidFill>
+                  <a:schemeClr val="bg1"/>
+                </a:solidFill>
+                <a:effectLst/>
+                <a:ea typeface="Times New Roman" panose="02020603050405020304" pitchFamily="18" charset="0"/>
+              </a:rPr>
+              <a:t>that contains all the points dominated by the </a:t>
+            </a:r>
+            <a:r>
+              <a:rPr lang="en-US" sz="1400" b="0" i="1" dirty="0">
+                <a:solidFill>
+                  <a:schemeClr val="bg1"/>
+                </a:solidFill>
+                <a:effectLst/>
+                <a:ea typeface="Times New Roman" panose="02020603050405020304" pitchFamily="18" charset="0"/>
+              </a:rPr>
+              <a:t>top_point</a:t>
+            </a:r>
+            <a:r>
+              <a:rPr lang="en-US" sz="1400" b="0" dirty="0">
+                <a:solidFill>
+                  <a:schemeClr val="bg1"/>
+                </a:solidFill>
+                <a:effectLst/>
+                <a:ea typeface="Times New Roman" panose="02020603050405020304" pitchFamily="18" charset="0"/>
+              </a:rPr>
+              <a:t> excluding itself and the points in the list </a:t>
+            </a:r>
+            <a:r>
+              <a:rPr lang="en-US" sz="1400" b="0" i="1" dirty="0">
+                <a:solidFill>
+                  <a:srgbClr val="92D050"/>
+                </a:solidFill>
+                <a:effectLst/>
+                <a:ea typeface="Times New Roman" panose="02020603050405020304" pitchFamily="18" charset="0"/>
+              </a:rPr>
+              <a:t>top_points</a:t>
+            </a:r>
+            <a:r>
+              <a:rPr lang="en-US" sz="1400" b="0" dirty="0">
+                <a:solidFill>
+                  <a:schemeClr val="bg1"/>
+                </a:solidFill>
+                <a:effectLst/>
+                <a:ea typeface="Times New Roman" panose="02020603050405020304" pitchFamily="18" charset="0"/>
+              </a:rPr>
+              <a:t>.</a:t>
+            </a:r>
+            <a:endParaRPr lang="el-GR" sz="1400" b="1" dirty="0">
+              <a:solidFill>
+                <a:schemeClr val="bg1"/>
+              </a:solidFill>
+              <a:effectLst/>
+              <a:ea typeface="Times New Roman" panose="02020603050405020304" pitchFamily="18" charset="0"/>
+            </a:endParaRPr>
+          </a:p>
+          <a:p>
+            <a:pPr marL="342900" lvl="0" indent="-342900" algn="just">
+              <a:spcBef>
+                <a:spcPts val="900"/>
+              </a:spcBef>
+              <a:spcAft>
+                <a:spcPts val="400"/>
+              </a:spcAft>
+              <a:buFont typeface="+mj-lt"/>
+              <a:buAutoNum type="arabicPeriod" startAt="6"/>
+            </a:pPr>
+            <a:r>
+              <a:rPr lang="en-US" sz="1400" b="0" dirty="0">
+                <a:solidFill>
+                  <a:schemeClr val="bg1"/>
+                </a:solidFill>
+                <a:effectLst/>
+                <a:ea typeface="Times New Roman" panose="02020603050405020304" pitchFamily="18" charset="0"/>
+              </a:rPr>
+              <a:t>Compute the skyline points of the </a:t>
+            </a:r>
+            <a:r>
+              <a:rPr lang="en-US" sz="1400" b="0" i="1" dirty="0">
+                <a:solidFill>
+                  <a:schemeClr val="accent6">
+                    <a:lumMod val="60000"/>
+                    <a:lumOff val="40000"/>
+                  </a:schemeClr>
+                </a:solidFill>
+                <a:effectLst/>
+                <a:ea typeface="Times New Roman" panose="02020603050405020304" pitchFamily="18" charset="0"/>
+              </a:rPr>
+              <a:t>dominated_points</a:t>
+            </a:r>
+            <a:r>
+              <a:rPr lang="en-US" sz="1400" b="0" dirty="0">
+                <a:solidFill>
+                  <a:schemeClr val="accent6">
+                    <a:lumMod val="60000"/>
+                    <a:lumOff val="40000"/>
+                  </a:schemeClr>
+                </a:solidFill>
+                <a:effectLst/>
+                <a:ea typeface="Times New Roman" panose="02020603050405020304" pitchFamily="18" charset="0"/>
+              </a:rPr>
+              <a:t> </a:t>
+            </a:r>
+            <a:r>
+              <a:rPr lang="en-US" sz="1400" b="0" dirty="0">
+                <a:solidFill>
+                  <a:schemeClr val="bg1"/>
+                </a:solidFill>
+                <a:effectLst/>
+                <a:ea typeface="Times New Roman" panose="02020603050405020304" pitchFamily="18" charset="0"/>
+              </a:rPr>
+              <a:t>list, using the algorithm described on task 1 and count the number of dominations for each one of them</a:t>
+            </a:r>
+            <a:endParaRPr lang="el-GR" sz="1400" b="1" dirty="0">
+              <a:solidFill>
+                <a:schemeClr val="bg1"/>
+              </a:solidFill>
+              <a:effectLst/>
+              <a:ea typeface="Times New Roman" panose="02020603050405020304" pitchFamily="18" charset="0"/>
+            </a:endParaRPr>
+          </a:p>
+          <a:p>
+            <a:pPr marL="342900" lvl="0" indent="-342900" algn="just">
+              <a:spcBef>
+                <a:spcPts val="900"/>
+              </a:spcBef>
+              <a:spcAft>
+                <a:spcPts val="400"/>
+              </a:spcAft>
+              <a:buFont typeface="+mj-lt"/>
+              <a:buAutoNum type="arabicPeriod" startAt="6"/>
+            </a:pPr>
+            <a:r>
+              <a:rPr lang="en-US" sz="1400" b="0" dirty="0">
+                <a:solidFill>
+                  <a:schemeClr val="bg1"/>
+                </a:solidFill>
+                <a:effectLst/>
+                <a:ea typeface="Times New Roman" panose="02020603050405020304" pitchFamily="18" charset="0"/>
+              </a:rPr>
+              <a:t>Add the skylines points of the </a:t>
+            </a:r>
+            <a:r>
+              <a:rPr lang="en-US" sz="1400" b="0" i="1" dirty="0">
+                <a:solidFill>
+                  <a:schemeClr val="accent6">
+                    <a:lumMod val="60000"/>
+                    <a:lumOff val="40000"/>
+                  </a:schemeClr>
+                </a:solidFill>
+                <a:effectLst/>
+                <a:ea typeface="Times New Roman" panose="02020603050405020304" pitchFamily="18" charset="0"/>
+              </a:rPr>
+              <a:t>dominated_points </a:t>
+            </a:r>
+            <a:r>
+              <a:rPr lang="en-US" sz="1400" b="0" dirty="0">
+                <a:solidFill>
+                  <a:schemeClr val="bg1"/>
+                </a:solidFill>
+                <a:effectLst/>
+                <a:ea typeface="Times New Roman" panose="02020603050405020304" pitchFamily="18" charset="0"/>
+              </a:rPr>
+              <a:t>list along with their dominations in the </a:t>
+            </a:r>
+            <a:r>
+              <a:rPr lang="en-US" sz="1400" b="0" i="1" dirty="0">
+                <a:solidFill>
+                  <a:schemeClr val="accent1">
+                    <a:lumMod val="40000"/>
+                    <a:lumOff val="60000"/>
+                  </a:schemeClr>
+                </a:solidFill>
+                <a:effectLst/>
+                <a:ea typeface="Times New Roman" panose="02020603050405020304" pitchFamily="18" charset="0"/>
+              </a:rPr>
+              <a:t>candidate_points</a:t>
+            </a:r>
+            <a:r>
+              <a:rPr lang="en-US" sz="1400" b="0" dirty="0">
+                <a:solidFill>
+                  <a:schemeClr val="accent1">
+                    <a:lumMod val="40000"/>
+                    <a:lumOff val="60000"/>
+                  </a:schemeClr>
+                </a:solidFill>
+                <a:effectLst/>
+                <a:ea typeface="Times New Roman" panose="02020603050405020304" pitchFamily="18" charset="0"/>
+              </a:rPr>
+              <a:t> </a:t>
+            </a:r>
+            <a:r>
+              <a:rPr lang="en-US" sz="1400" b="0" dirty="0">
+                <a:solidFill>
+                  <a:schemeClr val="bg1"/>
+                </a:solidFill>
+                <a:effectLst/>
+                <a:ea typeface="Times New Roman" panose="02020603050405020304" pitchFamily="18" charset="0"/>
+              </a:rPr>
+              <a:t>list</a:t>
+            </a:r>
+            <a:endParaRPr lang="en-US" sz="1400" b="1" dirty="0">
+              <a:solidFill>
+                <a:schemeClr val="bg1"/>
+              </a:solidFill>
+              <a:ea typeface="Times New Roman" panose="02020603050405020304" pitchFamily="18" charset="0"/>
+            </a:endParaRPr>
+          </a:p>
+          <a:p>
+            <a:pPr marL="342900" indent="-342900" algn="just">
+              <a:spcBef>
+                <a:spcPts val="900"/>
+              </a:spcBef>
+              <a:spcAft>
+                <a:spcPts val="400"/>
+              </a:spcAft>
+              <a:buFont typeface="+mj-lt"/>
+              <a:buAutoNum type="arabicPeriod" startAt="6"/>
+            </a:pPr>
+            <a:r>
+              <a:rPr lang="en-US" sz="1400" b="0" dirty="0">
+                <a:solidFill>
+                  <a:schemeClr val="bg1"/>
+                </a:solidFill>
+                <a:effectLst/>
+                <a:ea typeface="Times New Roman" panose="02020603050405020304" pitchFamily="18" charset="0"/>
+              </a:rPr>
+              <a:t>If the length of the </a:t>
+            </a:r>
+            <a:r>
+              <a:rPr lang="en-US" sz="1400" b="0" i="1" dirty="0">
+                <a:solidFill>
+                  <a:schemeClr val="accent1">
+                    <a:lumMod val="40000"/>
+                    <a:lumOff val="60000"/>
+                  </a:schemeClr>
+                </a:solidFill>
+                <a:effectLst/>
+                <a:ea typeface="Times New Roman" panose="02020603050405020304" pitchFamily="18" charset="0"/>
+              </a:rPr>
+              <a:t>candidate_points</a:t>
+            </a:r>
+            <a:r>
+              <a:rPr lang="en-US" sz="1400" b="0" dirty="0">
+                <a:solidFill>
+                  <a:schemeClr val="accent1">
+                    <a:lumMod val="40000"/>
+                    <a:lumOff val="60000"/>
+                  </a:schemeClr>
+                </a:solidFill>
+                <a:effectLst/>
+                <a:ea typeface="Times New Roman" panose="02020603050405020304" pitchFamily="18" charset="0"/>
+              </a:rPr>
+              <a:t> </a:t>
+            </a:r>
+            <a:r>
+              <a:rPr lang="en-US" sz="1400" b="0" dirty="0">
+                <a:solidFill>
+                  <a:schemeClr val="bg1"/>
+                </a:solidFill>
+                <a:effectLst/>
+                <a:ea typeface="Times New Roman" panose="02020603050405020304" pitchFamily="18" charset="0"/>
+              </a:rPr>
+              <a:t>list is zero or we got the top k points then return </a:t>
+            </a:r>
+            <a:r>
+              <a:rPr lang="en-US" sz="1400" b="0" i="1" dirty="0">
+                <a:solidFill>
+                  <a:srgbClr val="92D050"/>
+                </a:solidFill>
+                <a:effectLst/>
+                <a:ea typeface="Times New Roman" panose="02020603050405020304" pitchFamily="18" charset="0"/>
+              </a:rPr>
+              <a:t>top_points</a:t>
+            </a:r>
+            <a:r>
+              <a:rPr lang="en-US" sz="1400" b="0" dirty="0">
+                <a:solidFill>
+                  <a:srgbClr val="92D050"/>
+                </a:solidFill>
+                <a:effectLst/>
+                <a:ea typeface="Times New Roman" panose="02020603050405020304" pitchFamily="18" charset="0"/>
+              </a:rPr>
+              <a:t> </a:t>
+            </a:r>
+            <a:r>
+              <a:rPr lang="en-US" sz="1400" b="0" dirty="0">
+                <a:solidFill>
+                  <a:schemeClr val="bg1"/>
+                </a:solidFill>
+                <a:effectLst/>
+                <a:ea typeface="Times New Roman" panose="02020603050405020304" pitchFamily="18" charset="0"/>
+              </a:rPr>
+              <a:t>list else go to step 6</a:t>
+            </a:r>
+          </a:p>
+          <a:p>
+            <a:pPr marL="342900" lvl="0" indent="-342900" algn="just">
+              <a:spcBef>
+                <a:spcPts val="900"/>
+              </a:spcBef>
+              <a:spcAft>
+                <a:spcPts val="400"/>
+              </a:spcAft>
+              <a:buFont typeface="+mj-lt"/>
+              <a:buAutoNum type="arabicPeriod" startAt="6"/>
+            </a:pPr>
+            <a:endParaRPr lang="en-US" sz="1400" b="0" dirty="0">
+              <a:solidFill>
+                <a:schemeClr val="bg1"/>
+              </a:solidFill>
+              <a:effectLst/>
+              <a:ea typeface="Times New Roman" panose="02020603050405020304" pitchFamily="18" charset="0"/>
+            </a:endParaRPr>
           </a:p>
         </p:txBody>
       </p:sp>
     </p:spTree>
     <p:extLst>
       <p:ext uri="{BB962C8B-B14F-4D97-AF65-F5344CB8AC3E}">
-        <p14:creationId xmlns:p14="http://schemas.microsoft.com/office/powerpoint/2010/main" val="660312521"/>
+        <p14:creationId xmlns:p14="http://schemas.microsoft.com/office/powerpoint/2010/main" val="1076984916"/>
       </p:ext>
     </p:extLst>
   </p:cSld>
   <p:clrMapOvr>
     <a:masterClrMapping/>
   </p:clrMapOvr>
-  <mc:AlternateContent xmlns:mc="http://schemas.openxmlformats.org/markup-compatibility/2006" xmlns:p14="http://schemas.microsoft.com/office/powerpoint/2010/main">
-    <mc:Choice Requires="p14">
-      <p:transition spd="med" p14:dur="700">
-        <p:fade/>
-      </p:transition>
-    </mc:Choice>
-    <mc:Fallback xmlns="">
-      <p:transition spd="med">
-        <p:fade/>
-      </p:transition>
-    </mc:Fallback>
-  </mc:AlternateContent>
 </p:sld>
 </file>
 
@@ -27067,10 +28291,10 @@
       </p:grpSpPr>
       <p:sp>
         <p:nvSpPr>
-          <p:cNvPr id="4" name="Title 3">
+          <p:cNvPr id="2" name="Τίτλος 1">
             <a:extLst>
               <a:ext uri="{FF2B5EF4-FFF2-40B4-BE49-F238E27FC236}">
-                <a16:creationId xmlns:a16="http://schemas.microsoft.com/office/drawing/2014/main" id="{315E3981-F0D7-482C-A8E0-6A57700BECA7}"/>
+                <a16:creationId xmlns:a16="http://schemas.microsoft.com/office/drawing/2014/main" id="{A6F23DA2-8C28-CC7D-B19C-5A54995DFB0A}"/>
               </a:ext>
             </a:extLst>
           </p:cNvPr>
@@ -27081,24 +28305,30 @@
             <p:ph type="title"/>
           </p:nvPr>
         </p:nvSpPr>
-        <p:spPr/>
+        <p:spPr>
+          <a:xfrm>
+            <a:off x="444500" y="542925"/>
+            <a:ext cx="11214100" cy="535531"/>
+          </a:xfrm>
+        </p:spPr>
         <p:txBody>
           <a:bodyPr/>
           <a:lstStyle/>
           <a:p>
             <a:r>
               <a:rPr lang="en-US" dirty="0"/>
-              <a:t>Task 3</a:t>
+              <a:t>Top 3 points example</a:t>
             </a:r>
+            <a:endParaRPr lang="el-GR" dirty="0"/>
           </a:p>
         </p:txBody>
       </p:sp>
       <p:sp>
         <p:nvSpPr>
-          <p:cNvPr id="2" name="Slide Number Placeholder 1">
+          <p:cNvPr id="3" name="Θέση αριθμού διαφάνειας 2">
             <a:extLst>
               <a:ext uri="{FF2B5EF4-FFF2-40B4-BE49-F238E27FC236}">
-                <a16:creationId xmlns:a16="http://schemas.microsoft.com/office/drawing/2014/main" id="{520FC4EE-F318-4344-9E3C-B950ADB63865}"/>
+                <a16:creationId xmlns:a16="http://schemas.microsoft.com/office/drawing/2014/main" id="{D641B237-C610-F2A4-99F9-5C44C21A7B66}"/>
               </a:ext>
             </a:extLst>
           </p:cNvPr>
@@ -27115,137 +28345,611 @@
           <a:lstStyle/>
           <a:p>
             <a:fld id="{C263D6C4-4840-40CC-AC84-17E24B3B7BDE}" type="slidenum">
-              <a:rPr lang="en-US" smtClean="0"/>
+              <a:rPr lang="en-US" noProof="0" smtClean="0"/>
               <a:pPr/>
               <a:t>12</a:t>
             </a:fld>
-            <a:endParaRPr lang="en-US" dirty="0"/>
+            <a:endParaRPr lang="en-US" noProof="0" dirty="0"/>
           </a:p>
         </p:txBody>
       </p:sp>
-      <p:sp>
-        <p:nvSpPr>
-          <p:cNvPr id="7" name="Text Placeholder 6">
+      <p:pic>
+        <p:nvPicPr>
+          <p:cNvPr id="9" name="Εικόνα 8">
             <a:extLst>
               <a:ext uri="{FF2B5EF4-FFF2-40B4-BE49-F238E27FC236}">
-                <a16:creationId xmlns:a16="http://schemas.microsoft.com/office/drawing/2014/main" id="{B74126B4-1E6C-4FFF-9282-40E18A85A07F}"/>
+                <a16:creationId xmlns:a16="http://schemas.microsoft.com/office/drawing/2014/main" id="{0D157B8C-BFA1-28D7-B5FE-ACD766EC772A}"/>
               </a:ext>
             </a:extLst>
           </p:cNvPr>
-          <p:cNvSpPr>
-            <a:spLocks noGrp="1"/>
-          </p:cNvSpPr>
-          <p:nvPr>
-            <p:ph type="body" sz="quarter" idx="1"/>
-          </p:nvPr>
+          <p:cNvPicPr>
+            <a:picLocks noChangeAspect="1"/>
+          </p:cNvPicPr>
+          <p:nvPr/>
+        </p:nvPicPr>
+        <p:blipFill>
+          <a:blip r:embed="rId2"/>
+          <a:srcRect/>
+          <a:stretch/>
+        </p:blipFill>
+        <p:spPr>
+          <a:xfrm>
+            <a:off x="444500" y="1350793"/>
+            <a:ext cx="6703356" cy="5433247"/>
+          </a:xfrm>
+          <a:prstGeom prst="rect">
+            <a:avLst/>
+          </a:prstGeom>
+        </p:spPr>
+      </p:pic>
+      <p:sp>
+        <p:nvSpPr>
+          <p:cNvPr id="10" name="TextBox 9">
+            <a:extLst>
+              <a:ext uri="{FF2B5EF4-FFF2-40B4-BE49-F238E27FC236}">
+                <a16:creationId xmlns:a16="http://schemas.microsoft.com/office/drawing/2014/main" id="{9CEF2B1F-6A04-E030-3B9B-D56E893BAF76}"/>
+              </a:ext>
+            </a:extLst>
+          </p:cNvPr>
+          <p:cNvSpPr txBox="1"/>
+          <p:nvPr/>
         </p:nvSpPr>
         <p:spPr>
           <a:xfrm>
-            <a:off x="386526" y="1681163"/>
-            <a:ext cx="11418949" cy="823912"/>
+            <a:off x="7496734" y="1350793"/>
+            <a:ext cx="4623548" cy="4803879"/>
           </a:xfrm>
+          <a:prstGeom prst="rect">
+            <a:avLst/>
+          </a:prstGeom>
+          <a:noFill/>
         </p:spPr>
         <p:txBody>
-          <a:bodyPr>
-            <a:normAutofit/>
+          <a:bodyPr wrap="square" rtlCol="0">
+            <a:spAutoFit/>
           </a:bodyPr>
           <a:lstStyle/>
           <a:p>
-            <a:pPr algn="just"/>
+            <a:pPr marL="342900" lvl="0" indent="-342900" algn="just">
+              <a:spcBef>
+                <a:spcPts val="900"/>
+              </a:spcBef>
+              <a:spcAft>
+                <a:spcPts val="400"/>
+              </a:spcAft>
+              <a:buFont typeface="+mj-lt"/>
+              <a:buAutoNum type="arabicPeriod" startAt="6"/>
+            </a:pPr>
             <a:r>
-              <a:rPr lang="en-US" b="0" dirty="0"/>
-              <a:t>In Task 3, our work was to find the </a:t>
+              <a:rPr lang="en-US" sz="1400" b="0" dirty="0">
+                <a:solidFill>
+                  <a:schemeClr val="bg1"/>
+                </a:solidFill>
+                <a:effectLst/>
+                <a:ea typeface="Times New Roman" panose="02020603050405020304" pitchFamily="18" charset="0"/>
+              </a:rPr>
+              <a:t>Sort the </a:t>
             </a:r>
             <a:r>
-              <a:rPr lang="en-US" i="1" dirty="0"/>
-              <a:t>top-k </a:t>
+              <a:rPr lang="en-US" sz="1400" b="0" i="1" dirty="0">
+                <a:solidFill>
+                  <a:schemeClr val="accent1">
+                    <a:lumMod val="40000"/>
+                    <a:lumOff val="60000"/>
+                  </a:schemeClr>
+                </a:solidFill>
+                <a:effectLst/>
+                <a:ea typeface="Times New Roman" panose="02020603050405020304" pitchFamily="18" charset="0"/>
+              </a:rPr>
+              <a:t>candidate_points</a:t>
             </a:r>
             <a:r>
-              <a:rPr lang="en-US" dirty="0"/>
-              <a:t>dominating</a:t>
+              <a:rPr lang="en-US" sz="1400" b="0" dirty="0">
+                <a:solidFill>
+                  <a:schemeClr val="accent1">
+                    <a:lumMod val="40000"/>
+                    <a:lumOff val="60000"/>
+                  </a:schemeClr>
+                </a:solidFill>
+                <a:effectLst/>
+                <a:ea typeface="Times New Roman" panose="02020603050405020304" pitchFamily="18" charset="0"/>
+              </a:rPr>
+              <a:t> </a:t>
             </a:r>
             <a:r>
-              <a:rPr lang="en-US" b="0" dirty="0"/>
-              <a:t> points that belong to the </a:t>
+              <a:rPr lang="en-US" sz="1400" b="0" dirty="0">
+                <a:solidFill>
+                  <a:schemeClr val="bg1"/>
+                </a:solidFill>
+                <a:effectLst/>
+                <a:ea typeface="Times New Roman" panose="02020603050405020304" pitchFamily="18" charset="0"/>
+              </a:rPr>
+              <a:t>list by the number of dominations in descending order</a:t>
+            </a:r>
+            <a:endParaRPr lang="el-GR" sz="1400" b="1" dirty="0">
+              <a:solidFill>
+                <a:schemeClr val="bg1"/>
+              </a:solidFill>
+              <a:effectLst/>
+              <a:ea typeface="Times New Roman" panose="02020603050405020304" pitchFamily="18" charset="0"/>
+            </a:endParaRPr>
+          </a:p>
+          <a:p>
+            <a:pPr marL="342900" lvl="0" indent="-342900" algn="just">
+              <a:spcBef>
+                <a:spcPts val="900"/>
+              </a:spcBef>
+              <a:spcAft>
+                <a:spcPts val="400"/>
+              </a:spcAft>
+              <a:buFont typeface="+mj-lt"/>
+              <a:buAutoNum type="arabicPeriod" startAt="6"/>
+            </a:pPr>
+            <a:r>
+              <a:rPr lang="en-US" sz="1400" b="0" dirty="0">
+                <a:solidFill>
+                  <a:schemeClr val="bg1"/>
+                </a:solidFill>
+                <a:effectLst/>
+                <a:ea typeface="Times New Roman" panose="02020603050405020304" pitchFamily="18" charset="0"/>
+              </a:rPr>
+              <a:t>Get the first element </a:t>
             </a:r>
             <a:r>
-              <a:rPr lang="en-US" i="1" dirty="0"/>
-              <a:t>skyline</a:t>
+              <a:rPr lang="en-US" sz="1400" b="0" i="1" dirty="0">
+                <a:solidFill>
+                  <a:schemeClr val="bg1"/>
+                </a:solidFill>
+                <a:effectLst/>
+                <a:ea typeface="Times New Roman" panose="02020603050405020304" pitchFamily="18" charset="0"/>
+              </a:rPr>
+              <a:t>top_point</a:t>
             </a:r>
             <a:r>
-              <a:rPr lang="en-US" b="0" dirty="0"/>
-              <a:t> set.</a:t>
+              <a:rPr lang="en-US" sz="1400" b="0" dirty="0">
+                <a:solidFill>
+                  <a:schemeClr val="bg1"/>
+                </a:solidFill>
+                <a:effectLst/>
+                <a:ea typeface="Times New Roman" panose="02020603050405020304" pitchFamily="18" charset="0"/>
+              </a:rPr>
+              <a:t> of the </a:t>
             </a:r>
+            <a:r>
+              <a:rPr lang="en-US" sz="1400" b="0" i="1" dirty="0">
+                <a:solidFill>
+                  <a:schemeClr val="accent1">
+                    <a:lumMod val="40000"/>
+                    <a:lumOff val="60000"/>
+                  </a:schemeClr>
+                </a:solidFill>
+                <a:effectLst/>
+                <a:ea typeface="Times New Roman" panose="02020603050405020304" pitchFamily="18" charset="0"/>
+              </a:rPr>
+              <a:t>candidate_points</a:t>
+            </a:r>
+            <a:r>
+              <a:rPr lang="en-US" sz="1400" b="0" dirty="0">
+                <a:solidFill>
+                  <a:schemeClr val="accent1">
+                    <a:lumMod val="40000"/>
+                    <a:lumOff val="60000"/>
+                  </a:schemeClr>
+                </a:solidFill>
+                <a:effectLst/>
+                <a:ea typeface="Times New Roman" panose="02020603050405020304" pitchFamily="18" charset="0"/>
+              </a:rPr>
+              <a:t> </a:t>
+            </a:r>
+            <a:r>
+              <a:rPr lang="en-US" sz="1400" b="0" dirty="0">
+                <a:solidFill>
+                  <a:schemeClr val="bg1"/>
+                </a:solidFill>
+                <a:effectLst/>
+                <a:ea typeface="Times New Roman" panose="02020603050405020304" pitchFamily="18" charset="0"/>
+              </a:rPr>
+              <a:t>list, add it to the </a:t>
+            </a:r>
+            <a:r>
+              <a:rPr lang="en-US" sz="1400" b="0" i="1" dirty="0">
+                <a:solidFill>
+                  <a:srgbClr val="92D050"/>
+                </a:solidFill>
+                <a:effectLst/>
+                <a:ea typeface="Times New Roman" panose="02020603050405020304" pitchFamily="18" charset="0"/>
+              </a:rPr>
+              <a:t>top_points</a:t>
+            </a:r>
+            <a:r>
+              <a:rPr lang="en-US" sz="1400" b="0" dirty="0">
+                <a:solidFill>
+                  <a:srgbClr val="92D050"/>
+                </a:solidFill>
+                <a:effectLst/>
+                <a:ea typeface="Times New Roman" panose="02020603050405020304" pitchFamily="18" charset="0"/>
+              </a:rPr>
+              <a:t> </a:t>
+            </a:r>
+            <a:r>
+              <a:rPr lang="en-US" sz="1400" b="0" dirty="0">
+                <a:solidFill>
+                  <a:schemeClr val="bg1"/>
+                </a:solidFill>
+                <a:effectLst/>
+                <a:ea typeface="Times New Roman" panose="02020603050405020304" pitchFamily="18" charset="0"/>
+              </a:rPr>
+              <a:t>list and remove it from the dataset </a:t>
+            </a:r>
+            <a:r>
+              <a:rPr lang="en-US" sz="1400" b="0" i="1" dirty="0">
+                <a:solidFill>
+                  <a:schemeClr val="bg1"/>
+                </a:solidFill>
+                <a:effectLst/>
+                <a:ea typeface="Times New Roman" panose="02020603050405020304" pitchFamily="18" charset="0"/>
+              </a:rPr>
+              <a:t>points</a:t>
+            </a:r>
+            <a:endParaRPr lang="el-GR" sz="1400" b="1" dirty="0">
+              <a:solidFill>
+                <a:schemeClr val="bg1"/>
+              </a:solidFill>
+              <a:effectLst/>
+              <a:ea typeface="Times New Roman" panose="02020603050405020304" pitchFamily="18" charset="0"/>
+            </a:endParaRPr>
           </a:p>
-        </p:txBody>
-      </p:sp>
-      <p:sp>
-        <p:nvSpPr>
-          <p:cNvPr id="8" name="Text Placeholder 7">
-            <a:extLst>
-              <a:ext uri="{FF2B5EF4-FFF2-40B4-BE49-F238E27FC236}">
-                <a16:creationId xmlns:a16="http://schemas.microsoft.com/office/drawing/2014/main" id="{47DC4E62-1A34-4F98-A451-214F1808519C}"/>
-              </a:ext>
-            </a:extLst>
-          </p:cNvPr>
-          <p:cNvSpPr>
-            <a:spLocks noGrp="1"/>
-          </p:cNvSpPr>
-          <p:nvPr>
-            <p:ph type="body" sz="quarter" idx="2"/>
-          </p:nvPr>
-        </p:nvSpPr>
-        <p:spPr>
-          <a:xfrm>
-            <a:off x="6892801" y="2567781"/>
-            <a:ext cx="5157787" cy="3684588"/>
-          </a:xfrm>
-        </p:spPr>
-        <p:txBody>
-          <a:bodyPr/>
-          <a:lstStyle/>
           <a:p>
+            <a:pPr marL="342900" lvl="0" indent="-342900" algn="just">
+              <a:spcBef>
+                <a:spcPts val="900"/>
+              </a:spcBef>
+              <a:spcAft>
+                <a:spcPts val="400"/>
+              </a:spcAft>
+              <a:buFont typeface="+mj-lt"/>
+              <a:buAutoNum type="arabicPeriod" startAt="6"/>
+            </a:pPr>
             <a:r>
-              <a:rPr lang="en-US" dirty="0"/>
-              <a:t>Lorem ipsum dolor sit amet, consectetuer adipiscing elit. Maecenas porttitor congue massa. Fusce posuere, magna sed pulvinar ultricies, purus lectus malesuada libero, sit amet commodo magna eros quis urna. Nunc viverra imperdiet enim. Fusce est. Vivamus a tellus.</a:t>
+              <a:rPr lang="en-US" sz="1400" b="0" dirty="0">
+                <a:solidFill>
+                  <a:schemeClr val="bg1"/>
+                </a:solidFill>
+                <a:effectLst/>
+                <a:ea typeface="Times New Roman" panose="02020603050405020304" pitchFamily="18" charset="0"/>
+              </a:rPr>
+              <a:t>Create a list </a:t>
+            </a:r>
+            <a:r>
+              <a:rPr lang="en-US" sz="1400" b="0" i="1" dirty="0">
+                <a:solidFill>
+                  <a:schemeClr val="accent6">
+                    <a:lumMod val="60000"/>
+                    <a:lumOff val="40000"/>
+                  </a:schemeClr>
+                </a:solidFill>
+                <a:effectLst/>
+                <a:ea typeface="Times New Roman" panose="02020603050405020304" pitchFamily="18" charset="0"/>
+              </a:rPr>
+              <a:t>dominated_points (red rectangle)</a:t>
+            </a:r>
+            <a:r>
+              <a:rPr lang="en-US" sz="1400" b="0" dirty="0">
+                <a:solidFill>
+                  <a:schemeClr val="accent6">
+                    <a:lumMod val="60000"/>
+                    <a:lumOff val="40000"/>
+                  </a:schemeClr>
+                </a:solidFill>
+                <a:effectLst/>
+                <a:ea typeface="Times New Roman" panose="02020603050405020304" pitchFamily="18" charset="0"/>
+              </a:rPr>
+              <a:t> </a:t>
+            </a:r>
+            <a:r>
+              <a:rPr lang="en-US" sz="1400" b="0" dirty="0">
+                <a:solidFill>
+                  <a:schemeClr val="bg1"/>
+                </a:solidFill>
+                <a:effectLst/>
+                <a:ea typeface="Times New Roman" panose="02020603050405020304" pitchFamily="18" charset="0"/>
+              </a:rPr>
+              <a:t>that contains all the points dominated by the </a:t>
+            </a:r>
+            <a:r>
+              <a:rPr lang="en-US" sz="1400" b="0" i="1" dirty="0">
+                <a:solidFill>
+                  <a:schemeClr val="bg1"/>
+                </a:solidFill>
+                <a:effectLst/>
+                <a:ea typeface="Times New Roman" panose="02020603050405020304" pitchFamily="18" charset="0"/>
+              </a:rPr>
+              <a:t>top_point</a:t>
+            </a:r>
+            <a:r>
+              <a:rPr lang="en-US" sz="1400" b="0" dirty="0">
+                <a:solidFill>
+                  <a:schemeClr val="bg1"/>
+                </a:solidFill>
+                <a:effectLst/>
+                <a:ea typeface="Times New Roman" panose="02020603050405020304" pitchFamily="18" charset="0"/>
+              </a:rPr>
+              <a:t> excluding itself and the points in the list </a:t>
+            </a:r>
+            <a:r>
+              <a:rPr lang="en-US" sz="1400" b="0" i="1" dirty="0">
+                <a:solidFill>
+                  <a:srgbClr val="92D050"/>
+                </a:solidFill>
+                <a:effectLst/>
+                <a:ea typeface="Times New Roman" panose="02020603050405020304" pitchFamily="18" charset="0"/>
+              </a:rPr>
+              <a:t>top_points</a:t>
+            </a:r>
+            <a:r>
+              <a:rPr lang="en-US" sz="1400" b="0" dirty="0">
+                <a:solidFill>
+                  <a:schemeClr val="bg1"/>
+                </a:solidFill>
+                <a:effectLst/>
+                <a:ea typeface="Times New Roman" panose="02020603050405020304" pitchFamily="18" charset="0"/>
+              </a:rPr>
+              <a:t>.</a:t>
+            </a:r>
+            <a:endParaRPr lang="el-GR" sz="1400" b="1" dirty="0">
+              <a:solidFill>
+                <a:schemeClr val="bg1"/>
+              </a:solidFill>
+              <a:effectLst/>
+              <a:ea typeface="Times New Roman" panose="02020603050405020304" pitchFamily="18" charset="0"/>
+            </a:endParaRPr>
+          </a:p>
+          <a:p>
+            <a:pPr marL="342900" lvl="0" indent="-342900" algn="just">
+              <a:spcBef>
+                <a:spcPts val="900"/>
+              </a:spcBef>
+              <a:spcAft>
+                <a:spcPts val="400"/>
+              </a:spcAft>
+              <a:buFont typeface="+mj-lt"/>
+              <a:buAutoNum type="arabicPeriod" startAt="6"/>
+            </a:pPr>
+            <a:r>
+              <a:rPr lang="en-US" sz="1400" b="0" dirty="0">
+                <a:solidFill>
+                  <a:schemeClr val="bg1"/>
+                </a:solidFill>
+                <a:effectLst/>
+                <a:ea typeface="Times New Roman" panose="02020603050405020304" pitchFamily="18" charset="0"/>
+              </a:rPr>
+              <a:t>Compute the skyline points of the </a:t>
+            </a:r>
+            <a:r>
+              <a:rPr lang="en-US" sz="1400" b="0" i="1" dirty="0">
+                <a:solidFill>
+                  <a:schemeClr val="accent6">
+                    <a:lumMod val="60000"/>
+                    <a:lumOff val="40000"/>
+                  </a:schemeClr>
+                </a:solidFill>
+                <a:effectLst/>
+                <a:ea typeface="Times New Roman" panose="02020603050405020304" pitchFamily="18" charset="0"/>
+              </a:rPr>
+              <a:t>dominated_points</a:t>
+            </a:r>
+            <a:r>
+              <a:rPr lang="en-US" sz="1400" b="0" dirty="0">
+                <a:solidFill>
+                  <a:schemeClr val="accent6">
+                    <a:lumMod val="60000"/>
+                    <a:lumOff val="40000"/>
+                  </a:schemeClr>
+                </a:solidFill>
+                <a:effectLst/>
+                <a:ea typeface="Times New Roman" panose="02020603050405020304" pitchFamily="18" charset="0"/>
+              </a:rPr>
+              <a:t> </a:t>
+            </a:r>
+            <a:r>
+              <a:rPr lang="en-US" sz="1400" b="0" dirty="0">
+                <a:solidFill>
+                  <a:schemeClr val="bg1"/>
+                </a:solidFill>
+                <a:effectLst/>
+                <a:ea typeface="Times New Roman" panose="02020603050405020304" pitchFamily="18" charset="0"/>
+              </a:rPr>
+              <a:t>list, using the algorithm described on task 1 and count the number of dominations for each one of them</a:t>
+            </a:r>
+            <a:endParaRPr lang="el-GR" sz="1400" b="1" dirty="0">
+              <a:solidFill>
+                <a:schemeClr val="bg1"/>
+              </a:solidFill>
+              <a:effectLst/>
+              <a:ea typeface="Times New Roman" panose="02020603050405020304" pitchFamily="18" charset="0"/>
+            </a:endParaRPr>
+          </a:p>
+          <a:p>
+            <a:pPr marL="342900" lvl="0" indent="-342900" algn="just">
+              <a:spcBef>
+                <a:spcPts val="900"/>
+              </a:spcBef>
+              <a:spcAft>
+                <a:spcPts val="400"/>
+              </a:spcAft>
+              <a:buFont typeface="+mj-lt"/>
+              <a:buAutoNum type="arabicPeriod" startAt="6"/>
+            </a:pPr>
+            <a:r>
+              <a:rPr lang="en-US" sz="1400" b="0" dirty="0">
+                <a:solidFill>
+                  <a:schemeClr val="bg1"/>
+                </a:solidFill>
+                <a:effectLst/>
+                <a:ea typeface="Times New Roman" panose="02020603050405020304" pitchFamily="18" charset="0"/>
+              </a:rPr>
+              <a:t>Add the skylines points of the </a:t>
+            </a:r>
+            <a:r>
+              <a:rPr lang="en-US" sz="1400" b="0" i="1" dirty="0">
+                <a:solidFill>
+                  <a:schemeClr val="accent6">
+                    <a:lumMod val="60000"/>
+                    <a:lumOff val="40000"/>
+                  </a:schemeClr>
+                </a:solidFill>
+                <a:effectLst/>
+                <a:ea typeface="Times New Roman" panose="02020603050405020304" pitchFamily="18" charset="0"/>
+              </a:rPr>
+              <a:t>dominated_points </a:t>
+            </a:r>
+            <a:r>
+              <a:rPr lang="en-US" sz="1400" b="0" dirty="0">
+                <a:solidFill>
+                  <a:schemeClr val="bg1"/>
+                </a:solidFill>
+                <a:effectLst/>
+                <a:ea typeface="Times New Roman" panose="02020603050405020304" pitchFamily="18" charset="0"/>
+              </a:rPr>
+              <a:t>list along with their dominations in the </a:t>
+            </a:r>
+            <a:r>
+              <a:rPr lang="en-US" sz="1400" b="0" i="1" dirty="0">
+                <a:solidFill>
+                  <a:schemeClr val="accent1">
+                    <a:lumMod val="40000"/>
+                    <a:lumOff val="60000"/>
+                  </a:schemeClr>
+                </a:solidFill>
+                <a:effectLst/>
+                <a:ea typeface="Times New Roman" panose="02020603050405020304" pitchFamily="18" charset="0"/>
+              </a:rPr>
+              <a:t>candidate_points</a:t>
+            </a:r>
+            <a:r>
+              <a:rPr lang="en-US" sz="1400" b="0" dirty="0">
+                <a:solidFill>
+                  <a:schemeClr val="accent1">
+                    <a:lumMod val="40000"/>
+                    <a:lumOff val="60000"/>
+                  </a:schemeClr>
+                </a:solidFill>
+                <a:effectLst/>
+                <a:ea typeface="Times New Roman" panose="02020603050405020304" pitchFamily="18" charset="0"/>
+              </a:rPr>
+              <a:t> </a:t>
+            </a:r>
+            <a:r>
+              <a:rPr lang="en-US" sz="1400" b="0" dirty="0">
+                <a:solidFill>
+                  <a:schemeClr val="bg1"/>
+                </a:solidFill>
+                <a:effectLst/>
+                <a:ea typeface="Times New Roman" panose="02020603050405020304" pitchFamily="18" charset="0"/>
+              </a:rPr>
+              <a:t>list</a:t>
             </a:r>
           </a:p>
           <a:p>
+            <a:pPr marL="342900" indent="-342900" algn="just">
+              <a:spcBef>
+                <a:spcPts val="900"/>
+              </a:spcBef>
+              <a:spcAft>
+                <a:spcPts val="400"/>
+              </a:spcAft>
+              <a:buFont typeface="+mj-lt"/>
+              <a:buAutoNum type="arabicPeriod" startAt="6"/>
+            </a:pPr>
             <a:r>
-              <a:rPr lang="en-US" dirty="0"/>
-              <a:t>Pellentesque habitant morbi tristique senectus et netus et malesuada fames ac turpis egestas. Proin pharetra nonummy pede. Mauris et orci.</a:t>
+              <a:rPr lang="en-US" sz="1400" b="0" dirty="0">
+                <a:solidFill>
+                  <a:schemeClr val="bg1"/>
+                </a:solidFill>
+                <a:effectLst/>
+                <a:ea typeface="Times New Roman" panose="02020603050405020304" pitchFamily="18" charset="0"/>
+              </a:rPr>
+              <a:t>If the length of the </a:t>
             </a:r>
-          </a:p>
-          <a:p>
-            <a:endParaRPr lang="en-US" dirty="0"/>
-          </a:p>
-          <a:p>
-            <a:endParaRPr lang="en-US" dirty="0"/>
+            <a:r>
+              <a:rPr lang="en-US" sz="1400" b="0" i="1" dirty="0">
+                <a:solidFill>
+                  <a:schemeClr val="accent1">
+                    <a:lumMod val="40000"/>
+                    <a:lumOff val="60000"/>
+                  </a:schemeClr>
+                </a:solidFill>
+                <a:effectLst/>
+                <a:ea typeface="Times New Roman" panose="02020603050405020304" pitchFamily="18" charset="0"/>
+              </a:rPr>
+              <a:t>candidate_points</a:t>
+            </a:r>
+            <a:r>
+              <a:rPr lang="en-US" sz="1400" b="0" dirty="0">
+                <a:solidFill>
+                  <a:schemeClr val="accent1">
+                    <a:lumMod val="40000"/>
+                    <a:lumOff val="60000"/>
+                  </a:schemeClr>
+                </a:solidFill>
+                <a:effectLst/>
+                <a:ea typeface="Times New Roman" panose="02020603050405020304" pitchFamily="18" charset="0"/>
+              </a:rPr>
+              <a:t> </a:t>
+            </a:r>
+            <a:r>
+              <a:rPr lang="en-US" sz="1400" b="0" dirty="0">
+                <a:solidFill>
+                  <a:schemeClr val="bg1"/>
+                </a:solidFill>
+                <a:effectLst/>
+                <a:ea typeface="Times New Roman" panose="02020603050405020304" pitchFamily="18" charset="0"/>
+              </a:rPr>
+              <a:t>list is zero or we got the top k points then return </a:t>
+            </a:r>
+            <a:r>
+              <a:rPr lang="en-US" sz="1400" b="0" i="1" dirty="0">
+                <a:solidFill>
+                  <a:srgbClr val="92D050"/>
+                </a:solidFill>
+                <a:effectLst/>
+                <a:ea typeface="Times New Roman" panose="02020603050405020304" pitchFamily="18" charset="0"/>
+              </a:rPr>
+              <a:t>top_points</a:t>
+            </a:r>
+            <a:r>
+              <a:rPr lang="en-US" sz="1400" b="0" dirty="0">
+                <a:solidFill>
+                  <a:srgbClr val="92D050"/>
+                </a:solidFill>
+                <a:effectLst/>
+                <a:ea typeface="Times New Roman" panose="02020603050405020304" pitchFamily="18" charset="0"/>
+              </a:rPr>
+              <a:t> </a:t>
+            </a:r>
+            <a:r>
+              <a:rPr lang="en-US" sz="1400" b="0" dirty="0">
+                <a:solidFill>
+                  <a:schemeClr val="bg1"/>
+                </a:solidFill>
+                <a:effectLst/>
+                <a:ea typeface="Times New Roman" panose="02020603050405020304" pitchFamily="18" charset="0"/>
+              </a:rPr>
+              <a:t>list else go to step 6</a:t>
+            </a:r>
           </a:p>
         </p:txBody>
       </p:sp>
     </p:spTree>
     <p:extLst>
       <p:ext uri="{BB962C8B-B14F-4D97-AF65-F5344CB8AC3E}">
-        <p14:creationId xmlns:p14="http://schemas.microsoft.com/office/powerpoint/2010/main" val="905488132"/>
+        <p14:creationId xmlns:p14="http://schemas.microsoft.com/office/powerpoint/2010/main" val="1820242964"/>
       </p:ext>
     </p:extLst>
   </p:cSld>
   <p:clrMapOvr>
     <a:masterClrMapping/>
   </p:clrMapOvr>
-  <mc:AlternateContent xmlns:mc="http://schemas.openxmlformats.org/markup-compatibility/2006" xmlns:p14="http://schemas.microsoft.com/office/powerpoint/2010/main">
-    <mc:Choice Requires="p14">
-      <p:transition spd="med" p14:dur="700">
-        <p:fade/>
-      </p:transition>
-    </mc:Choice>
-    <mc:Fallback xmlns="">
-      <p:transition spd="med">
-        <p:fade/>
-      </p:transition>
-    </mc:Fallback>
-  </mc:AlternateContent>
 </p:sld>
 </file>
 
@@ -27289,7 +28993,7 @@
           <a:p>
             <a:r>
               <a:rPr lang="en-US" dirty="0"/>
-              <a:t>Task 3</a:t>
+              <a:t>Task 2</a:t>
             </a:r>
           </a:p>
         </p:txBody>
@@ -27460,6 +29164,607 @@
     </p:spTree>
     <p:extLst>
       <p:ext uri="{BB962C8B-B14F-4D97-AF65-F5344CB8AC3E}">
+        <p14:creationId xmlns:p14="http://schemas.microsoft.com/office/powerpoint/2010/main" val="458156879"/>
+      </p:ext>
+    </p:extLst>
+  </p:cSld>
+  <p:clrMapOvr>
+    <a:masterClrMapping/>
+  </p:clrMapOvr>
+  <mc:AlternateContent xmlns:mc="http://schemas.openxmlformats.org/markup-compatibility/2006" xmlns:p14="http://schemas.microsoft.com/office/powerpoint/2010/main">
+    <mc:Choice Requires="p14">
+      <p:transition spd="med" p14:dur="700">
+        <p:fade/>
+      </p:transition>
+    </mc:Choice>
+    <mc:Fallback xmlns="">
+      <p:transition spd="med">
+        <p:fade/>
+      </p:transition>
+    </mc:Fallback>
+  </mc:AlternateContent>
+</p:sld>
+</file>
+
+<file path=ppt/slides/slide14.xml><?xml version="1.0" encoding="utf-8"?>
+<p:sld xmlns:a="http://schemas.openxmlformats.org/drawingml/2006/main" xmlns:r="http://schemas.openxmlformats.org/officeDocument/2006/relationships" xmlns:p="http://schemas.openxmlformats.org/presentationml/2006/main">
+  <p:cSld>
+    <p:spTree>
+      <p:nvGrpSpPr>
+        <p:cNvPr id="1" name=""/>
+        <p:cNvGrpSpPr/>
+        <p:nvPr/>
+      </p:nvGrpSpPr>
+      <p:grpSpPr>
+        <a:xfrm>
+          <a:off x="0" y="0"/>
+          <a:ext cx="0" cy="0"/>
+          <a:chOff x="0" y="0"/>
+          <a:chExt cx="0" cy="0"/>
+        </a:xfrm>
+      </p:grpSpPr>
+      <p:sp>
+        <p:nvSpPr>
+          <p:cNvPr id="2" name="Slide Number Placeholder 1">
+            <a:extLst>
+              <a:ext uri="{FF2B5EF4-FFF2-40B4-BE49-F238E27FC236}">
+                <a16:creationId xmlns:a16="http://schemas.microsoft.com/office/drawing/2014/main" id="{ED5D82C7-8910-CEE9-A138-FEAA3F66FEC7}"/>
+              </a:ext>
+            </a:extLst>
+          </p:cNvPr>
+          <p:cNvSpPr>
+            <a:spLocks noGrp="1"/>
+          </p:cNvSpPr>
+          <p:nvPr>
+            <p:ph type="sldNum" sz="quarter" idx="12"/>
+          </p:nvPr>
+        </p:nvSpPr>
+        <p:spPr/>
+        <p:txBody>
+          <a:bodyPr/>
+          <a:lstStyle/>
+          <a:p>
+            <a:fld id="{C263D6C4-4840-40CC-AC84-17E24B3B7BDE}" type="slidenum">
+              <a:rPr lang="en-US" noProof="0" smtClean="0"/>
+              <a:pPr/>
+              <a:t>14</a:t>
+            </a:fld>
+            <a:endParaRPr lang="en-US" noProof="0" dirty="0"/>
+          </a:p>
+        </p:txBody>
+      </p:sp>
+    </p:spTree>
+    <p:extLst>
+      <p:ext uri="{BB962C8B-B14F-4D97-AF65-F5344CB8AC3E}">
+        <p14:creationId xmlns:p14="http://schemas.microsoft.com/office/powerpoint/2010/main" val="1592003877"/>
+      </p:ext>
+    </p:extLst>
+  </p:cSld>
+  <p:clrMapOvr>
+    <a:masterClrMapping/>
+  </p:clrMapOvr>
+</p:sld>
+</file>
+
+<file path=ppt/slides/slide15.xml><?xml version="1.0" encoding="utf-8"?>
+<p:sld xmlns:a="http://schemas.openxmlformats.org/drawingml/2006/main" xmlns:r="http://schemas.openxmlformats.org/officeDocument/2006/relationships" xmlns:p="http://schemas.openxmlformats.org/presentationml/2006/main">
+  <p:cSld>
+    <p:spTree>
+      <p:nvGrpSpPr>
+        <p:cNvPr id="1" name=""/>
+        <p:cNvGrpSpPr/>
+        <p:nvPr/>
+      </p:nvGrpSpPr>
+      <p:grpSpPr>
+        <a:xfrm>
+          <a:off x="0" y="0"/>
+          <a:ext cx="0" cy="0"/>
+          <a:chOff x="0" y="0"/>
+          <a:chExt cx="0" cy="0"/>
+        </a:xfrm>
+      </p:grpSpPr>
+      <p:sp>
+        <p:nvSpPr>
+          <p:cNvPr id="4" name="Title 3">
+            <a:extLst>
+              <a:ext uri="{FF2B5EF4-FFF2-40B4-BE49-F238E27FC236}">
+                <a16:creationId xmlns:a16="http://schemas.microsoft.com/office/drawing/2014/main" id="{BD179B88-D43C-4A31-9A52-3498E9430782}"/>
+              </a:ext>
+            </a:extLst>
+          </p:cNvPr>
+          <p:cNvSpPr>
+            <a:spLocks noGrp="1"/>
+          </p:cNvSpPr>
+          <p:nvPr>
+            <p:ph type="title"/>
+          </p:nvPr>
+        </p:nvSpPr>
+        <p:spPr/>
+        <p:txBody>
+          <a:bodyPr>
+            <a:noAutofit/>
+          </a:bodyPr>
+          <a:lstStyle/>
+          <a:p>
+            <a:r>
+              <a:rPr lang="en-US" i="1" dirty="0"/>
+              <a:t>Top-k </a:t>
+            </a:r>
+            <a:r>
+              <a:rPr lang="en-US" dirty="0"/>
+              <a:t>skyline domination query</a:t>
+            </a:r>
+            <a:endParaRPr lang="en-US" i="1" dirty="0"/>
+          </a:p>
+        </p:txBody>
+      </p:sp>
+      <p:sp>
+        <p:nvSpPr>
+          <p:cNvPr id="2" name="Slide Number Placeholder 1">
+            <a:extLst>
+              <a:ext uri="{FF2B5EF4-FFF2-40B4-BE49-F238E27FC236}">
+                <a16:creationId xmlns:a16="http://schemas.microsoft.com/office/drawing/2014/main" id="{8B065C75-272B-4BB5-BA23-D80E8654D621}"/>
+              </a:ext>
+            </a:extLst>
+          </p:cNvPr>
+          <p:cNvSpPr>
+            <a:spLocks noGrp="1"/>
+          </p:cNvSpPr>
+          <p:nvPr>
+            <p:ph type="sldNum" sz="quarter" idx="12"/>
+          </p:nvPr>
+        </p:nvSpPr>
+        <p:spPr/>
+        <p:txBody>
+          <a:bodyPr/>
+          <a:lstStyle/>
+          <a:p>
+            <a:fld id="{C263D6C4-4840-40CC-AC84-17E24B3B7BDE}" type="slidenum">
+              <a:rPr lang="en-US" smtClean="0"/>
+              <a:pPr/>
+              <a:t>15</a:t>
+            </a:fld>
+            <a:endParaRPr lang="en-US" dirty="0"/>
+          </a:p>
+        </p:txBody>
+      </p:sp>
+    </p:spTree>
+    <p:extLst>
+      <p:ext uri="{BB962C8B-B14F-4D97-AF65-F5344CB8AC3E}">
+        <p14:creationId xmlns:p14="http://schemas.microsoft.com/office/powerpoint/2010/main" val="660312521"/>
+      </p:ext>
+    </p:extLst>
+  </p:cSld>
+  <p:clrMapOvr>
+    <a:masterClrMapping/>
+  </p:clrMapOvr>
+  <mc:AlternateContent xmlns:mc="http://schemas.openxmlformats.org/markup-compatibility/2006" xmlns:p14="http://schemas.microsoft.com/office/powerpoint/2010/main">
+    <mc:Choice Requires="p14">
+      <p:transition spd="med" p14:dur="700">
+        <p:fade/>
+      </p:transition>
+    </mc:Choice>
+    <mc:Fallback xmlns="">
+      <p:transition spd="med">
+        <p:fade/>
+      </p:transition>
+    </mc:Fallback>
+  </mc:AlternateContent>
+</p:sld>
+</file>
+
+<file path=ppt/slides/slide16.xml><?xml version="1.0" encoding="utf-8"?>
+<p:sld xmlns:a="http://schemas.openxmlformats.org/drawingml/2006/main" xmlns:r="http://schemas.openxmlformats.org/officeDocument/2006/relationships" xmlns:p="http://schemas.openxmlformats.org/presentationml/2006/main">
+  <p:cSld>
+    <p:spTree>
+      <p:nvGrpSpPr>
+        <p:cNvPr id="1" name=""/>
+        <p:cNvGrpSpPr/>
+        <p:nvPr/>
+      </p:nvGrpSpPr>
+      <p:grpSpPr>
+        <a:xfrm>
+          <a:off x="0" y="0"/>
+          <a:ext cx="0" cy="0"/>
+          <a:chOff x="0" y="0"/>
+          <a:chExt cx="0" cy="0"/>
+        </a:xfrm>
+      </p:grpSpPr>
+      <p:sp>
+        <p:nvSpPr>
+          <p:cNvPr id="4" name="Title 3">
+            <a:extLst>
+              <a:ext uri="{FF2B5EF4-FFF2-40B4-BE49-F238E27FC236}">
+                <a16:creationId xmlns:a16="http://schemas.microsoft.com/office/drawing/2014/main" id="{315E3981-F0D7-482C-A8E0-6A57700BECA7}"/>
+              </a:ext>
+            </a:extLst>
+          </p:cNvPr>
+          <p:cNvSpPr>
+            <a:spLocks noGrp="1"/>
+          </p:cNvSpPr>
+          <p:nvPr>
+            <p:ph type="title"/>
+          </p:nvPr>
+        </p:nvSpPr>
+        <p:spPr/>
+        <p:txBody>
+          <a:bodyPr/>
+          <a:lstStyle/>
+          <a:p>
+            <a:r>
+              <a:rPr lang="en-US" dirty="0"/>
+              <a:t>Task 3</a:t>
+            </a:r>
+          </a:p>
+        </p:txBody>
+      </p:sp>
+      <p:sp>
+        <p:nvSpPr>
+          <p:cNvPr id="2" name="Slide Number Placeholder 1">
+            <a:extLst>
+              <a:ext uri="{FF2B5EF4-FFF2-40B4-BE49-F238E27FC236}">
+                <a16:creationId xmlns:a16="http://schemas.microsoft.com/office/drawing/2014/main" id="{520FC4EE-F318-4344-9E3C-B950ADB63865}"/>
+              </a:ext>
+            </a:extLst>
+          </p:cNvPr>
+          <p:cNvSpPr>
+            <a:spLocks noGrp="1"/>
+          </p:cNvSpPr>
+          <p:nvPr>
+            <p:ph type="sldNum" sz="quarter" idx="12"/>
+          </p:nvPr>
+        </p:nvSpPr>
+        <p:spPr/>
+        <p:txBody>
+          <a:bodyPr/>
+          <a:lstStyle/>
+          <a:p>
+            <a:fld id="{C263D6C4-4840-40CC-AC84-17E24B3B7BDE}" type="slidenum">
+              <a:rPr lang="en-US" smtClean="0"/>
+              <a:pPr/>
+              <a:t>16</a:t>
+            </a:fld>
+            <a:endParaRPr lang="en-US" dirty="0"/>
+          </a:p>
+        </p:txBody>
+      </p:sp>
+      <p:sp>
+        <p:nvSpPr>
+          <p:cNvPr id="7" name="Text Placeholder 6">
+            <a:extLst>
+              <a:ext uri="{FF2B5EF4-FFF2-40B4-BE49-F238E27FC236}">
+                <a16:creationId xmlns:a16="http://schemas.microsoft.com/office/drawing/2014/main" id="{B74126B4-1E6C-4FFF-9282-40E18A85A07F}"/>
+              </a:ext>
+            </a:extLst>
+          </p:cNvPr>
+          <p:cNvSpPr>
+            <a:spLocks noGrp="1"/>
+          </p:cNvSpPr>
+          <p:nvPr>
+            <p:ph type="body" sz="quarter" idx="1"/>
+          </p:nvPr>
+        </p:nvSpPr>
+        <p:spPr>
+          <a:xfrm>
+            <a:off x="386526" y="1681163"/>
+            <a:ext cx="11418949" cy="823912"/>
+          </a:xfrm>
+        </p:spPr>
+        <p:txBody>
+          <a:bodyPr>
+            <a:normAutofit/>
+          </a:bodyPr>
+          <a:lstStyle/>
+          <a:p>
+            <a:pPr algn="just"/>
+            <a:r>
+              <a:rPr lang="en-US" b="0" dirty="0"/>
+              <a:t>In Task 3, our work was to find the </a:t>
+            </a:r>
+            <a:r>
+              <a:rPr lang="en-US" i="1" dirty="0"/>
+              <a:t>top-k </a:t>
+            </a:r>
+            <a:r>
+              <a:rPr lang="en-US" dirty="0"/>
+              <a:t>dominating</a:t>
+            </a:r>
+            <a:r>
+              <a:rPr lang="en-US" b="0" dirty="0"/>
+              <a:t> points that belong to the </a:t>
+            </a:r>
+            <a:r>
+              <a:rPr lang="en-US" i="1" dirty="0"/>
+              <a:t>skyline</a:t>
+            </a:r>
+            <a:r>
+              <a:rPr lang="en-US" b="0" dirty="0"/>
+              <a:t> set.</a:t>
+            </a:r>
+          </a:p>
+        </p:txBody>
+      </p:sp>
+      <p:sp>
+        <p:nvSpPr>
+          <p:cNvPr id="8" name="Text Placeholder 7">
+            <a:extLst>
+              <a:ext uri="{FF2B5EF4-FFF2-40B4-BE49-F238E27FC236}">
+                <a16:creationId xmlns:a16="http://schemas.microsoft.com/office/drawing/2014/main" id="{47DC4E62-1A34-4F98-A451-214F1808519C}"/>
+              </a:ext>
+            </a:extLst>
+          </p:cNvPr>
+          <p:cNvSpPr>
+            <a:spLocks noGrp="1"/>
+          </p:cNvSpPr>
+          <p:nvPr>
+            <p:ph type="body" sz="quarter" idx="2"/>
+          </p:nvPr>
+        </p:nvSpPr>
+        <p:spPr>
+          <a:xfrm>
+            <a:off x="6892801" y="2567781"/>
+            <a:ext cx="5157787" cy="3684588"/>
+          </a:xfrm>
+        </p:spPr>
+        <p:txBody>
+          <a:bodyPr/>
+          <a:lstStyle/>
+          <a:p>
+            <a:r>
+              <a:rPr lang="en-US" dirty="0"/>
+              <a:t>Lorem ipsum dolor sit amet, consectetuer adipiscing elit. Maecenas porttitor congue massa. Fusce posuere, magna sed pulvinar ultricies, purus lectus malesuada libero, sit amet commodo magna eros quis urna. Nunc viverra imperdiet enim. Fusce est. Vivamus a tellus.</a:t>
+            </a:r>
+          </a:p>
+          <a:p>
+            <a:r>
+              <a:rPr lang="en-US" dirty="0"/>
+              <a:t>Pellentesque habitant morbi tristique senectus et netus et malesuada fames ac turpis egestas. Proin pharetra nonummy pede. Mauris et orci.</a:t>
+            </a:r>
+          </a:p>
+          <a:p>
+            <a:endParaRPr lang="en-US" dirty="0"/>
+          </a:p>
+          <a:p>
+            <a:endParaRPr lang="en-US" dirty="0"/>
+          </a:p>
+        </p:txBody>
+      </p:sp>
+    </p:spTree>
+    <p:extLst>
+      <p:ext uri="{BB962C8B-B14F-4D97-AF65-F5344CB8AC3E}">
+        <p14:creationId xmlns:p14="http://schemas.microsoft.com/office/powerpoint/2010/main" val="905488132"/>
+      </p:ext>
+    </p:extLst>
+  </p:cSld>
+  <p:clrMapOvr>
+    <a:masterClrMapping/>
+  </p:clrMapOvr>
+  <mc:AlternateContent xmlns:mc="http://schemas.openxmlformats.org/markup-compatibility/2006" xmlns:p14="http://schemas.microsoft.com/office/powerpoint/2010/main">
+    <mc:Choice Requires="p14">
+      <p:transition spd="med" p14:dur="700">
+        <p:fade/>
+      </p:transition>
+    </mc:Choice>
+    <mc:Fallback xmlns="">
+      <p:transition spd="med">
+        <p:fade/>
+      </p:transition>
+    </mc:Fallback>
+  </mc:AlternateContent>
+</p:sld>
+</file>
+
+<file path=ppt/slides/slide17.xml><?xml version="1.0" encoding="utf-8"?>
+<p:sld xmlns:a="http://schemas.openxmlformats.org/drawingml/2006/main" xmlns:r="http://schemas.openxmlformats.org/officeDocument/2006/relationships" xmlns:p="http://schemas.openxmlformats.org/presentationml/2006/main">
+  <p:cSld>
+    <p:spTree>
+      <p:nvGrpSpPr>
+        <p:cNvPr id="1" name=""/>
+        <p:cNvGrpSpPr/>
+        <p:nvPr/>
+      </p:nvGrpSpPr>
+      <p:grpSpPr>
+        <a:xfrm>
+          <a:off x="0" y="0"/>
+          <a:ext cx="0" cy="0"/>
+          <a:chOff x="0" y="0"/>
+          <a:chExt cx="0" cy="0"/>
+        </a:xfrm>
+      </p:grpSpPr>
+      <p:sp>
+        <p:nvSpPr>
+          <p:cNvPr id="4" name="Title 3">
+            <a:extLst>
+              <a:ext uri="{FF2B5EF4-FFF2-40B4-BE49-F238E27FC236}">
+                <a16:creationId xmlns:a16="http://schemas.microsoft.com/office/drawing/2014/main" id="{315E3981-F0D7-482C-A8E0-6A57700BECA7}"/>
+              </a:ext>
+            </a:extLst>
+          </p:cNvPr>
+          <p:cNvSpPr>
+            <a:spLocks noGrp="1"/>
+          </p:cNvSpPr>
+          <p:nvPr>
+            <p:ph type="title"/>
+          </p:nvPr>
+        </p:nvSpPr>
+        <p:spPr/>
+        <p:txBody>
+          <a:bodyPr/>
+          <a:lstStyle/>
+          <a:p>
+            <a:r>
+              <a:rPr lang="en-US" dirty="0"/>
+              <a:t>Task 3</a:t>
+            </a:r>
+          </a:p>
+        </p:txBody>
+      </p:sp>
+      <p:sp>
+        <p:nvSpPr>
+          <p:cNvPr id="2" name="Slide Number Placeholder 1">
+            <a:extLst>
+              <a:ext uri="{FF2B5EF4-FFF2-40B4-BE49-F238E27FC236}">
+                <a16:creationId xmlns:a16="http://schemas.microsoft.com/office/drawing/2014/main" id="{520FC4EE-F318-4344-9E3C-B950ADB63865}"/>
+              </a:ext>
+            </a:extLst>
+          </p:cNvPr>
+          <p:cNvSpPr>
+            <a:spLocks noGrp="1"/>
+          </p:cNvSpPr>
+          <p:nvPr>
+            <p:ph type="sldNum" sz="quarter" idx="12"/>
+          </p:nvPr>
+        </p:nvSpPr>
+        <p:spPr/>
+        <p:txBody>
+          <a:bodyPr/>
+          <a:lstStyle/>
+          <a:p>
+            <a:fld id="{C263D6C4-4840-40CC-AC84-17E24B3B7BDE}" type="slidenum">
+              <a:rPr lang="en-US" smtClean="0"/>
+              <a:pPr/>
+              <a:t>17</a:t>
+            </a:fld>
+            <a:endParaRPr lang="en-US" dirty="0"/>
+          </a:p>
+        </p:txBody>
+      </p:sp>
+      <p:sp>
+        <p:nvSpPr>
+          <p:cNvPr id="7" name="Text Placeholder 6">
+            <a:extLst>
+              <a:ext uri="{FF2B5EF4-FFF2-40B4-BE49-F238E27FC236}">
+                <a16:creationId xmlns:a16="http://schemas.microsoft.com/office/drawing/2014/main" id="{B74126B4-1E6C-4FFF-9282-40E18A85A07F}"/>
+              </a:ext>
+            </a:extLst>
+          </p:cNvPr>
+          <p:cNvSpPr>
+            <a:spLocks noGrp="1"/>
+          </p:cNvSpPr>
+          <p:nvPr>
+            <p:ph type="body" sz="quarter" idx="1"/>
+          </p:nvPr>
+        </p:nvSpPr>
+        <p:spPr/>
+        <p:txBody>
+          <a:bodyPr/>
+          <a:lstStyle/>
+          <a:p>
+            <a:r>
+              <a:rPr lang="en-US" dirty="0"/>
+              <a:t>Lorem ipsum dolor sit amet</a:t>
+            </a:r>
+          </a:p>
+        </p:txBody>
+      </p:sp>
+      <p:sp>
+        <p:nvSpPr>
+          <p:cNvPr id="5" name="Text Placeholder 4">
+            <a:extLst>
+              <a:ext uri="{FF2B5EF4-FFF2-40B4-BE49-F238E27FC236}">
+                <a16:creationId xmlns:a16="http://schemas.microsoft.com/office/drawing/2014/main" id="{E0C87788-476B-4620-8002-A5C1177AD6C1}"/>
+              </a:ext>
+            </a:extLst>
+          </p:cNvPr>
+          <p:cNvSpPr>
+            <a:spLocks noGrp="1"/>
+          </p:cNvSpPr>
+          <p:nvPr>
+            <p:ph type="body" sz="quarter" idx="3"/>
+          </p:nvPr>
+        </p:nvSpPr>
+        <p:spPr/>
+        <p:txBody>
+          <a:bodyPr/>
+          <a:lstStyle/>
+          <a:p>
+            <a:r>
+              <a:rPr lang="en-US" dirty="0"/>
+              <a:t>Lorem ipsum dolor sit amet</a:t>
+            </a:r>
+          </a:p>
+        </p:txBody>
+      </p:sp>
+      <p:sp>
+        <p:nvSpPr>
+          <p:cNvPr id="8" name="Text Placeholder 7">
+            <a:extLst>
+              <a:ext uri="{FF2B5EF4-FFF2-40B4-BE49-F238E27FC236}">
+                <a16:creationId xmlns:a16="http://schemas.microsoft.com/office/drawing/2014/main" id="{47DC4E62-1A34-4F98-A451-214F1808519C}"/>
+              </a:ext>
+            </a:extLst>
+          </p:cNvPr>
+          <p:cNvSpPr>
+            <a:spLocks noGrp="1"/>
+          </p:cNvSpPr>
+          <p:nvPr>
+            <p:ph type="body" sz="quarter" idx="2"/>
+          </p:nvPr>
+        </p:nvSpPr>
+        <p:spPr/>
+        <p:txBody>
+          <a:bodyPr/>
+          <a:lstStyle/>
+          <a:p>
+            <a:r>
+              <a:rPr lang="en-US" dirty="0"/>
+              <a:t>Lorem ipsum dolor sit amet, consectetuer adipiscing elit. Maecenas porttitor congue massa. Fusce posuere, magna sed pulvinar ultricies, purus lectus malesuada libero, sit amet commodo magna eros quis urna. Nunc viverra imperdiet enim. Fusce est. Vivamus a tellus.</a:t>
+            </a:r>
+          </a:p>
+          <a:p>
+            <a:r>
+              <a:rPr lang="en-US" dirty="0"/>
+              <a:t>Pellentesque habitant morbi tristique senectus et netus et malesuada fames ac turpis egestas. Proin pharetra nonummy pede. Mauris et orci.</a:t>
+            </a:r>
+          </a:p>
+          <a:p>
+            <a:endParaRPr lang="en-US" dirty="0"/>
+          </a:p>
+          <a:p>
+            <a:endParaRPr lang="en-US" dirty="0"/>
+          </a:p>
+        </p:txBody>
+      </p:sp>
+      <p:sp>
+        <p:nvSpPr>
+          <p:cNvPr id="6" name="Text Placeholder 5">
+            <a:extLst>
+              <a:ext uri="{FF2B5EF4-FFF2-40B4-BE49-F238E27FC236}">
+                <a16:creationId xmlns:a16="http://schemas.microsoft.com/office/drawing/2014/main" id="{000A9570-5EF6-4AFB-9FCA-7C8998E3FEB1}"/>
+              </a:ext>
+            </a:extLst>
+          </p:cNvPr>
+          <p:cNvSpPr>
+            <a:spLocks noGrp="1"/>
+          </p:cNvSpPr>
+          <p:nvPr>
+            <p:ph type="body" sz="quarter" idx="4"/>
+          </p:nvPr>
+        </p:nvSpPr>
+        <p:spPr/>
+        <p:txBody>
+          <a:bodyPr/>
+          <a:lstStyle/>
+          <a:p>
+            <a:r>
+              <a:rPr lang="en-US" dirty="0"/>
+              <a:t>Lorem ipsum dolor sit amet, consectetuer adipiscing elit. Maecenas porttitor congue massa. Fusce posuere, magna sed pulvinar ultricies, purus lectus malesuada libero, sit amet commodo magna eros quis urna. Nunc viverra imperdiet enim. Fusce est. Vivamus a tellus.</a:t>
+            </a:r>
+          </a:p>
+          <a:p>
+            <a:r>
+              <a:rPr lang="en-US" dirty="0"/>
+              <a:t>Pellentesque habitant morbi tristique senectus et netus et malesuada fames ac turpis egestas. Proin pharetra nonummy pede. Mauris et orci.</a:t>
+            </a:r>
+          </a:p>
+          <a:p>
+            <a:endParaRPr lang="en-US" dirty="0"/>
+          </a:p>
+        </p:txBody>
+      </p:sp>
+    </p:spTree>
+    <p:extLst>
+      <p:ext uri="{BB962C8B-B14F-4D97-AF65-F5344CB8AC3E}">
         <p14:creationId xmlns:p14="http://schemas.microsoft.com/office/powerpoint/2010/main" val="2229238531"/>
       </p:ext>
     </p:extLst>
@@ -27482,7 +29787,7 @@
 </p:sld>
 </file>
 
-<file path=ppt/slides/slide14.xml><?xml version="1.0" encoding="utf-8"?>
+<file path=ppt/slides/slide18.xml><?xml version="1.0" encoding="utf-8"?>
 <p:sld xmlns:a="http://schemas.openxmlformats.org/drawingml/2006/main" xmlns:r="http://schemas.openxmlformats.org/officeDocument/2006/relationships" xmlns:p="http://schemas.openxmlformats.org/presentationml/2006/main">
   <p:cSld>
     <p:spTree>
@@ -27553,7 +29858,7 @@
             <a:fld id="{C263D6C4-4840-40CC-AC84-17E24B3B7BDE}" type="slidenum">
               <a:rPr lang="en-US" smtClean="0"/>
               <a:pPr/>
-              <a:t>14</a:t>
+              <a:t>18</a:t>
             </a:fld>
             <a:endParaRPr lang="en-US" dirty="0"/>
           </a:p>
@@ -27584,7 +29889,7 @@
 </p:sld>
 </file>
 
-<file path=ppt/slides/slide15.xml><?xml version="1.0" encoding="utf-8"?>
+<file path=ppt/slides/slide19.xml><?xml version="1.0" encoding="utf-8"?>
 <p:sld xmlns:a="http://schemas.openxmlformats.org/drawingml/2006/main" xmlns:r="http://schemas.openxmlformats.org/officeDocument/2006/relationships" xmlns:p="http://schemas.openxmlformats.org/presentationml/2006/main">
   <p:cSld>
     <p:spTree>
@@ -27968,7 +30273,7 @@
             <a:fld id="{C263D6C4-4840-40CC-AC84-17E24B3B7BDE}" type="slidenum">
               <a:rPr lang="en-US" smtClean="0"/>
               <a:pPr/>
-              <a:t>15</a:t>
+              <a:t>19</a:t>
             </a:fld>
             <a:endParaRPr lang="en-US" dirty="0"/>
           </a:p>
@@ -27999,7 +30304,239 @@
 </p:sld>
 </file>
 
-<file path=ppt/slides/slide16.xml><?xml version="1.0" encoding="utf-8"?>
+<file path=ppt/slides/slide2.xml><?xml version="1.0" encoding="utf-8"?>
+<p:sld xmlns:a="http://schemas.openxmlformats.org/drawingml/2006/main" xmlns:r="http://schemas.openxmlformats.org/officeDocument/2006/relationships" xmlns:p="http://schemas.openxmlformats.org/presentationml/2006/main">
+  <p:cSld>
+    <p:spTree>
+      <p:nvGrpSpPr>
+        <p:cNvPr id="1" name=""/>
+        <p:cNvGrpSpPr/>
+        <p:nvPr/>
+      </p:nvGrpSpPr>
+      <p:grpSpPr>
+        <a:xfrm>
+          <a:off x="0" y="0"/>
+          <a:ext cx="0" cy="0"/>
+          <a:chOff x="0" y="0"/>
+          <a:chExt cx="0" cy="0"/>
+        </a:xfrm>
+      </p:grpSpPr>
+      <p:sp>
+        <p:nvSpPr>
+          <p:cNvPr id="7" name="Title 6">
+            <a:extLst>
+              <a:ext uri="{FF2B5EF4-FFF2-40B4-BE49-F238E27FC236}">
+                <a16:creationId xmlns:a16="http://schemas.microsoft.com/office/drawing/2014/main" id="{7875C19A-1AAE-476A-A316-A2CF92D763D3}"/>
+              </a:ext>
+            </a:extLst>
+          </p:cNvPr>
+          <p:cNvSpPr>
+            <a:spLocks noGrp="1"/>
+          </p:cNvSpPr>
+          <p:nvPr>
+            <p:ph type="title"/>
+          </p:nvPr>
+        </p:nvSpPr>
+        <p:spPr>
+          <a:xfrm>
+            <a:off x="444500" y="542925"/>
+            <a:ext cx="11214100" cy="590931"/>
+          </a:xfrm>
+        </p:spPr>
+        <p:txBody>
+          <a:bodyPr/>
+          <a:lstStyle/>
+          <a:p>
+            <a:r>
+              <a:rPr lang="en-US" sz="3600" dirty="0"/>
+              <a:t>Project Analysis</a:t>
+            </a:r>
+          </a:p>
+        </p:txBody>
+      </p:sp>
+      <p:sp>
+        <p:nvSpPr>
+          <p:cNvPr id="10" name="Text Placeholder 9">
+            <a:extLst>
+              <a:ext uri="{FF2B5EF4-FFF2-40B4-BE49-F238E27FC236}">
+                <a16:creationId xmlns:a16="http://schemas.microsoft.com/office/drawing/2014/main" id="{EF2BC084-E6DB-4DE7-B309-042A85EBA700}"/>
+              </a:ext>
+            </a:extLst>
+          </p:cNvPr>
+          <p:cNvSpPr>
+            <a:spLocks noGrp="1"/>
+          </p:cNvSpPr>
+          <p:nvPr>
+            <p:ph type="body" sz="quarter" idx="13"/>
+          </p:nvPr>
+        </p:nvSpPr>
+        <p:spPr>
+          <a:xfrm>
+            <a:off x="533400" y="3255434"/>
+            <a:ext cx="6718300" cy="4093243"/>
+          </a:xfrm>
+        </p:spPr>
+        <p:txBody>
+          <a:bodyPr/>
+          <a:lstStyle/>
+          <a:p>
+            <a:r>
+              <a:rPr lang="en-US" sz="2400" dirty="0"/>
+              <a:t>Skyline query</a:t>
+            </a:r>
+          </a:p>
+          <a:p>
+            <a:r>
+              <a:rPr lang="en-US" sz="2400" i="1" dirty="0"/>
+              <a:t>Top-k </a:t>
+            </a:r>
+            <a:r>
+              <a:rPr lang="en-US" sz="2400" dirty="0"/>
+              <a:t>domination query</a:t>
+            </a:r>
+            <a:endParaRPr lang="en-US" sz="2400" i="1" dirty="0"/>
+          </a:p>
+          <a:p>
+            <a:r>
+              <a:rPr lang="en-US" sz="2400" i="1" dirty="0"/>
+              <a:t>Top-k </a:t>
+            </a:r>
+            <a:r>
+              <a:rPr lang="en-US" sz="2400" dirty="0"/>
+              <a:t>skyline</a:t>
+            </a:r>
+            <a:r>
+              <a:rPr lang="en-US" sz="2400" i="1" dirty="0"/>
+              <a:t> </a:t>
+            </a:r>
+            <a:r>
+              <a:rPr lang="en-US" sz="2400" dirty="0"/>
+              <a:t>domination query</a:t>
+            </a:r>
+            <a:endParaRPr lang="en-US" sz="2400" i="1" dirty="0"/>
+          </a:p>
+          <a:p>
+            <a:endParaRPr lang="en-US" dirty="0"/>
+          </a:p>
+        </p:txBody>
+      </p:sp>
+      <p:sp>
+        <p:nvSpPr>
+          <p:cNvPr id="2" name="Slide Number Placeholder 1">
+            <a:extLst>
+              <a:ext uri="{FF2B5EF4-FFF2-40B4-BE49-F238E27FC236}">
+                <a16:creationId xmlns:a16="http://schemas.microsoft.com/office/drawing/2014/main" id="{BE9800F6-D571-48C4-8466-12AA1ADB6599}"/>
+              </a:ext>
+            </a:extLst>
+          </p:cNvPr>
+          <p:cNvSpPr>
+            <a:spLocks noGrp="1"/>
+          </p:cNvSpPr>
+          <p:nvPr>
+            <p:ph type="sldNum" sz="quarter" idx="12"/>
+          </p:nvPr>
+        </p:nvSpPr>
+        <p:spPr/>
+        <p:txBody>
+          <a:bodyPr/>
+          <a:lstStyle/>
+          <a:p>
+            <a:fld id="{C263D6C4-4840-40CC-AC84-17E24B3B7BDE}" type="slidenum">
+              <a:rPr lang="en-US" smtClean="0"/>
+              <a:pPr/>
+              <a:t>2</a:t>
+            </a:fld>
+            <a:endParaRPr lang="en-US" dirty="0"/>
+          </a:p>
+        </p:txBody>
+      </p:sp>
+      <p:sp>
+        <p:nvSpPr>
+          <p:cNvPr id="3" name="TextBox 2">
+            <a:extLst>
+              <a:ext uri="{FF2B5EF4-FFF2-40B4-BE49-F238E27FC236}">
+                <a16:creationId xmlns:a16="http://schemas.microsoft.com/office/drawing/2014/main" id="{829FF87A-705E-B625-0420-C66C77A3A161}"/>
+              </a:ext>
+            </a:extLst>
+          </p:cNvPr>
+          <p:cNvSpPr txBox="1"/>
+          <p:nvPr/>
+        </p:nvSpPr>
+        <p:spPr>
+          <a:xfrm>
+            <a:off x="444500" y="1439332"/>
+            <a:ext cx="7222067" cy="1754326"/>
+          </a:xfrm>
+          <a:prstGeom prst="rect">
+            <a:avLst/>
+          </a:prstGeom>
+          <a:noFill/>
+        </p:spPr>
+        <p:txBody>
+          <a:bodyPr wrap="square" rtlCol="0">
+            <a:spAutoFit/>
+          </a:bodyPr>
+          <a:lstStyle/>
+          <a:p>
+            <a:r>
+              <a:rPr lang="en-US" dirty="0">
+                <a:solidFill>
+                  <a:schemeClr val="bg1"/>
+                </a:solidFill>
+              </a:rPr>
+              <a:t>In this project, we will work with multi-dimensional data. Given a potentially large set of d-dimensional points, where each point is represented as a d-dimensional vector, we need to detect interesting points. The project is based on the concept of dominance.</a:t>
+            </a:r>
+          </a:p>
+          <a:p>
+            <a:endParaRPr lang="en-US" dirty="0">
+              <a:solidFill>
+                <a:schemeClr val="bg1"/>
+              </a:solidFill>
+            </a:endParaRPr>
+          </a:p>
+          <a:p>
+            <a:r>
+              <a:rPr lang="en-US" dirty="0">
+                <a:solidFill>
+                  <a:schemeClr val="bg1"/>
+                </a:solidFill>
+              </a:rPr>
+              <a:t>The tasks are:</a:t>
+            </a:r>
+            <a:endParaRPr lang="en-150" dirty="0">
+              <a:solidFill>
+                <a:schemeClr val="bg1"/>
+              </a:solidFill>
+            </a:endParaRPr>
+          </a:p>
+        </p:txBody>
+      </p:sp>
+    </p:spTree>
+    <p:extLst>
+      <p:ext uri="{BB962C8B-B14F-4D97-AF65-F5344CB8AC3E}">
+        <p14:creationId xmlns:p14="http://schemas.microsoft.com/office/powerpoint/2010/main" val="3733486012"/>
+      </p:ext>
+    </p:extLst>
+  </p:cSld>
+  <p:clrMapOvr>
+    <a:masterClrMapping/>
+  </p:clrMapOvr>
+  <mc:AlternateContent xmlns:mc="http://schemas.openxmlformats.org/markup-compatibility/2006" xmlns:p14="http://schemas.microsoft.com/office/powerpoint/2010/main">
+    <mc:Choice Requires="p14">
+      <p:transition spd="med" p14:dur="700">
+        <p:fade/>
+      </p:transition>
+    </mc:Choice>
+    <mc:Fallback xmlns="">
+      <p:transition spd="med">
+        <p:fade/>
+      </p:transition>
+    </mc:Fallback>
+  </mc:AlternateContent>
+</p:sld>
+</file>
+
+<file path=ppt/slides/slide20.xml><?xml version="1.0" encoding="utf-8"?>
 <p:sld xmlns:a="http://schemas.openxmlformats.org/drawingml/2006/main" xmlns:r="http://schemas.openxmlformats.org/officeDocument/2006/relationships" xmlns:p="http://schemas.openxmlformats.org/presentationml/2006/main">
   <p:cSld>
     <p:spTree>
@@ -28183,7 +30720,7 @@
             <a:fld id="{C263D6C4-4840-40CC-AC84-17E24B3B7BDE}" type="slidenum">
               <a:rPr lang="en-US" smtClean="0"/>
               <a:pPr/>
-              <a:t>16</a:t>
+              <a:t>20</a:t>
             </a:fld>
             <a:endParaRPr lang="en-US" dirty="0"/>
           </a:p>
@@ -28214,7 +30751,7 @@
 </p:sld>
 </file>
 
-<file path=ppt/slides/slide17.xml><?xml version="1.0" encoding="utf-8"?>
+<file path=ppt/slides/slide21.xml><?xml version="1.0" encoding="utf-8"?>
 <p:sld xmlns:a="http://schemas.openxmlformats.org/drawingml/2006/main" xmlns:r="http://schemas.openxmlformats.org/officeDocument/2006/relationships" xmlns:p="http://schemas.openxmlformats.org/presentationml/2006/main">
   <p:cSld>
     <p:spTree>
@@ -28351,7 +30888,7 @@
             <a:fld id="{C263D6C4-4840-40CC-AC84-17E24B3B7BDE}" type="slidenum">
               <a:rPr lang="en-US" smtClean="0"/>
               <a:pPr/>
-              <a:t>17</a:t>
+              <a:t>21</a:t>
             </a:fld>
             <a:endParaRPr lang="en-US" dirty="0"/>
           </a:p>
@@ -28382,7 +30919,7 @@
 </p:sld>
 </file>
 
-<file path=ppt/slides/slide18.xml><?xml version="1.0" encoding="utf-8"?>
+<file path=ppt/slides/slide22.xml><?xml version="1.0" encoding="utf-8"?>
 <p:sld xmlns:a="http://schemas.openxmlformats.org/drawingml/2006/main" xmlns:r="http://schemas.openxmlformats.org/officeDocument/2006/relationships" xmlns:p="http://schemas.openxmlformats.org/presentationml/2006/main">
   <p:cSld>
     <p:spTree>
@@ -30272,7 +32809,7 @@
             <a:fld id="{C263D6C4-4840-40CC-AC84-17E24B3B7BDE}" type="slidenum">
               <a:rPr lang="en-US" smtClean="0"/>
               <a:pPr/>
-              <a:t>18</a:t>
+              <a:t>22</a:t>
             </a:fld>
             <a:endParaRPr lang="en-US" dirty="0"/>
           </a:p>
@@ -30303,7 +32840,7 @@
 </p:sld>
 </file>
 
-<file path=ppt/slides/slide19.xml><?xml version="1.0" encoding="utf-8"?>
+<file path=ppt/slides/slide23.xml><?xml version="1.0" encoding="utf-8"?>
 <p:sld xmlns:a="http://schemas.openxmlformats.org/drawingml/2006/main" xmlns:r="http://schemas.openxmlformats.org/officeDocument/2006/relationships" xmlns:p="http://schemas.openxmlformats.org/presentationml/2006/main">
   <p:cSld>
     <p:spTree>
@@ -30400,7 +32937,7 @@
             <a:fld id="{C263D6C4-4840-40CC-AC84-17E24B3B7BDE}" type="slidenum">
               <a:rPr lang="en-US" smtClean="0"/>
               <a:pPr/>
-              <a:t>19</a:t>
+              <a:t>23</a:t>
             </a:fld>
             <a:endParaRPr lang="en-US" dirty="0"/>
           </a:p>
@@ -30431,239 +32968,7 @@
 </p:sld>
 </file>
 
-<file path=ppt/slides/slide2.xml><?xml version="1.0" encoding="utf-8"?>
-<p:sld xmlns:a="http://schemas.openxmlformats.org/drawingml/2006/main" xmlns:r="http://schemas.openxmlformats.org/officeDocument/2006/relationships" xmlns:p="http://schemas.openxmlformats.org/presentationml/2006/main">
-  <p:cSld>
-    <p:spTree>
-      <p:nvGrpSpPr>
-        <p:cNvPr id="1" name=""/>
-        <p:cNvGrpSpPr/>
-        <p:nvPr/>
-      </p:nvGrpSpPr>
-      <p:grpSpPr>
-        <a:xfrm>
-          <a:off x="0" y="0"/>
-          <a:ext cx="0" cy="0"/>
-          <a:chOff x="0" y="0"/>
-          <a:chExt cx="0" cy="0"/>
-        </a:xfrm>
-      </p:grpSpPr>
-      <p:sp>
-        <p:nvSpPr>
-          <p:cNvPr id="7" name="Title 6">
-            <a:extLst>
-              <a:ext uri="{FF2B5EF4-FFF2-40B4-BE49-F238E27FC236}">
-                <a16:creationId xmlns:a16="http://schemas.microsoft.com/office/drawing/2014/main" id="{7875C19A-1AAE-476A-A316-A2CF92D763D3}"/>
-              </a:ext>
-            </a:extLst>
-          </p:cNvPr>
-          <p:cNvSpPr>
-            <a:spLocks noGrp="1"/>
-          </p:cNvSpPr>
-          <p:nvPr>
-            <p:ph type="title"/>
-          </p:nvPr>
-        </p:nvSpPr>
-        <p:spPr>
-          <a:xfrm>
-            <a:off x="444500" y="542925"/>
-            <a:ext cx="11214100" cy="590931"/>
-          </a:xfrm>
-        </p:spPr>
-        <p:txBody>
-          <a:bodyPr/>
-          <a:lstStyle/>
-          <a:p>
-            <a:r>
-              <a:rPr lang="en-US" sz="3600" dirty="0"/>
-              <a:t>Project Analysis</a:t>
-            </a:r>
-          </a:p>
-        </p:txBody>
-      </p:sp>
-      <p:sp>
-        <p:nvSpPr>
-          <p:cNvPr id="10" name="Text Placeholder 9">
-            <a:extLst>
-              <a:ext uri="{FF2B5EF4-FFF2-40B4-BE49-F238E27FC236}">
-                <a16:creationId xmlns:a16="http://schemas.microsoft.com/office/drawing/2014/main" id="{EF2BC084-E6DB-4DE7-B309-042A85EBA700}"/>
-              </a:ext>
-            </a:extLst>
-          </p:cNvPr>
-          <p:cNvSpPr>
-            <a:spLocks noGrp="1"/>
-          </p:cNvSpPr>
-          <p:nvPr>
-            <p:ph type="body" sz="quarter" idx="13"/>
-          </p:nvPr>
-        </p:nvSpPr>
-        <p:spPr>
-          <a:xfrm>
-            <a:off x="533400" y="3255434"/>
-            <a:ext cx="6718300" cy="4093243"/>
-          </a:xfrm>
-        </p:spPr>
-        <p:txBody>
-          <a:bodyPr/>
-          <a:lstStyle/>
-          <a:p>
-            <a:r>
-              <a:rPr lang="en-US" sz="2400" dirty="0"/>
-              <a:t>Skyline query</a:t>
-            </a:r>
-          </a:p>
-          <a:p>
-            <a:r>
-              <a:rPr lang="en-US" sz="2400" i="1" dirty="0"/>
-              <a:t>Top-k </a:t>
-            </a:r>
-            <a:r>
-              <a:rPr lang="en-US" sz="2400" dirty="0"/>
-              <a:t>domination query</a:t>
-            </a:r>
-            <a:endParaRPr lang="en-US" sz="2400" i="1" dirty="0"/>
-          </a:p>
-          <a:p>
-            <a:r>
-              <a:rPr lang="en-US" sz="2400" i="1" dirty="0"/>
-              <a:t>Top-k </a:t>
-            </a:r>
-            <a:r>
-              <a:rPr lang="en-US" sz="2400" dirty="0"/>
-              <a:t>skyline</a:t>
-            </a:r>
-            <a:r>
-              <a:rPr lang="en-US" sz="2400" i="1" dirty="0"/>
-              <a:t> </a:t>
-            </a:r>
-            <a:r>
-              <a:rPr lang="en-US" sz="2400" dirty="0"/>
-              <a:t>domination query</a:t>
-            </a:r>
-            <a:endParaRPr lang="en-US" sz="2400" i="1" dirty="0"/>
-          </a:p>
-          <a:p>
-            <a:endParaRPr lang="en-US" dirty="0"/>
-          </a:p>
-        </p:txBody>
-      </p:sp>
-      <p:sp>
-        <p:nvSpPr>
-          <p:cNvPr id="2" name="Slide Number Placeholder 1">
-            <a:extLst>
-              <a:ext uri="{FF2B5EF4-FFF2-40B4-BE49-F238E27FC236}">
-                <a16:creationId xmlns:a16="http://schemas.microsoft.com/office/drawing/2014/main" id="{BE9800F6-D571-48C4-8466-12AA1ADB6599}"/>
-              </a:ext>
-            </a:extLst>
-          </p:cNvPr>
-          <p:cNvSpPr>
-            <a:spLocks noGrp="1"/>
-          </p:cNvSpPr>
-          <p:nvPr>
-            <p:ph type="sldNum" sz="quarter" idx="12"/>
-          </p:nvPr>
-        </p:nvSpPr>
-        <p:spPr/>
-        <p:txBody>
-          <a:bodyPr/>
-          <a:lstStyle/>
-          <a:p>
-            <a:fld id="{C263D6C4-4840-40CC-AC84-17E24B3B7BDE}" type="slidenum">
-              <a:rPr lang="en-US" smtClean="0"/>
-              <a:pPr/>
-              <a:t>2</a:t>
-            </a:fld>
-            <a:endParaRPr lang="en-US" dirty="0"/>
-          </a:p>
-        </p:txBody>
-      </p:sp>
-      <p:sp>
-        <p:nvSpPr>
-          <p:cNvPr id="3" name="TextBox 2">
-            <a:extLst>
-              <a:ext uri="{FF2B5EF4-FFF2-40B4-BE49-F238E27FC236}">
-                <a16:creationId xmlns:a16="http://schemas.microsoft.com/office/drawing/2014/main" id="{829FF87A-705E-B625-0420-C66C77A3A161}"/>
-              </a:ext>
-            </a:extLst>
-          </p:cNvPr>
-          <p:cNvSpPr txBox="1"/>
-          <p:nvPr/>
-        </p:nvSpPr>
-        <p:spPr>
-          <a:xfrm>
-            <a:off x="444500" y="1439332"/>
-            <a:ext cx="7222067" cy="1754326"/>
-          </a:xfrm>
-          <a:prstGeom prst="rect">
-            <a:avLst/>
-          </a:prstGeom>
-          <a:noFill/>
-        </p:spPr>
-        <p:txBody>
-          <a:bodyPr wrap="square" rtlCol="0">
-            <a:spAutoFit/>
-          </a:bodyPr>
-          <a:lstStyle/>
-          <a:p>
-            <a:r>
-              <a:rPr lang="en-US" dirty="0">
-                <a:solidFill>
-                  <a:schemeClr val="bg1"/>
-                </a:solidFill>
-              </a:rPr>
-              <a:t>In this project, we will work with multi-dimensional data. Given a potentially large set of d-dimensional points, where each point is represented as a d-dimensional vector, we need to detect interesting points. The project is based on the concept of dominance.</a:t>
-            </a:r>
-          </a:p>
-          <a:p>
-            <a:endParaRPr lang="en-US" dirty="0">
-              <a:solidFill>
-                <a:schemeClr val="bg1"/>
-              </a:solidFill>
-            </a:endParaRPr>
-          </a:p>
-          <a:p>
-            <a:r>
-              <a:rPr lang="en-US" dirty="0">
-                <a:solidFill>
-                  <a:schemeClr val="bg1"/>
-                </a:solidFill>
-              </a:rPr>
-              <a:t>The tasks are:</a:t>
-            </a:r>
-            <a:endParaRPr lang="en-150" dirty="0">
-              <a:solidFill>
-                <a:schemeClr val="bg1"/>
-              </a:solidFill>
-            </a:endParaRPr>
-          </a:p>
-        </p:txBody>
-      </p:sp>
-    </p:spTree>
-    <p:extLst>
-      <p:ext uri="{BB962C8B-B14F-4D97-AF65-F5344CB8AC3E}">
-        <p14:creationId xmlns:p14="http://schemas.microsoft.com/office/powerpoint/2010/main" val="3733486012"/>
-      </p:ext>
-    </p:extLst>
-  </p:cSld>
-  <p:clrMapOvr>
-    <a:masterClrMapping/>
-  </p:clrMapOvr>
-  <mc:AlternateContent xmlns:mc="http://schemas.openxmlformats.org/markup-compatibility/2006" xmlns:p14="http://schemas.microsoft.com/office/powerpoint/2010/main">
-    <mc:Choice Requires="p14">
-      <p:transition spd="med" p14:dur="700">
-        <p:fade/>
-      </p:transition>
-    </mc:Choice>
-    <mc:Fallback xmlns="">
-      <p:transition spd="med">
-        <p:fade/>
-      </p:transition>
-    </mc:Fallback>
-  </mc:AlternateContent>
-</p:sld>
-</file>
-
-<file path=ppt/slides/slide20.xml><?xml version="1.0" encoding="utf-8"?>
+<file path=ppt/slides/slide24.xml><?xml version="1.0" encoding="utf-8"?>
 <p:sld xmlns:a="http://schemas.openxmlformats.org/drawingml/2006/main" xmlns:r="http://schemas.openxmlformats.org/officeDocument/2006/relationships" xmlns:p="http://schemas.openxmlformats.org/presentationml/2006/main">
   <p:cSld>
     <p:spTree>
@@ -31870,7 +34175,7 @@
         </p:nvSpPr>
         <p:spPr>
           <a:xfrm>
-            <a:off x="386526" y="1681163"/>
+            <a:off x="386525" y="1438230"/>
             <a:ext cx="11418949" cy="823912"/>
           </a:xfrm>
         </p:spPr>
@@ -31914,30 +34219,509 @@
         </p:nvSpPr>
         <p:spPr>
           <a:xfrm>
-            <a:off x="6892801" y="2567781"/>
-            <a:ext cx="5157787" cy="3684588"/>
+            <a:off x="4223104" y="1967613"/>
+            <a:ext cx="7503778" cy="4037784"/>
           </a:xfrm>
         </p:spPr>
         <p:txBody>
-          <a:bodyPr/>
+          <a:bodyPr>
+            <a:noAutofit/>
+          </a:bodyPr>
           <a:lstStyle/>
           <a:p>
+            <a:pPr marL="0" lvl="0" indent="0" algn="just">
+              <a:spcBef>
+                <a:spcPts val="900"/>
+              </a:spcBef>
+              <a:spcAft>
+                <a:spcPts val="400"/>
+              </a:spcAft>
+              <a:buNone/>
+            </a:pPr>
             <a:r>
-              <a:rPr lang="en-US" dirty="0"/>
-              <a:t>Lorem ipsum dolor sit amet, consectetuer adipiscing elit. Maecenas porttitor congue massa. Fusce posuere, magna sed pulvinar ultricies, purus lectus malesuada libero, sit amet commodo magna eros quis urna. Nunc viverra imperdiet enim. Fusce est. Vivamus a tellus.</a:t>
+              <a:rPr lang="en-US" sz="1100" b="1" dirty="0">
+                <a:effectLst/>
+                <a:ea typeface="Times New Roman" panose="02020603050405020304" pitchFamily="18" charset="0"/>
+              </a:rPr>
+              <a:t>Implemented Algorithm</a:t>
+            </a:r>
+            <a:r>
+              <a:rPr lang="en-US" sz="1100" b="0" dirty="0">
+                <a:effectLst/>
+                <a:ea typeface="Times New Roman" panose="02020603050405020304" pitchFamily="18" charset="0"/>
+              </a:rPr>
+              <a:t> </a:t>
             </a:r>
           </a:p>
           <a:p>
+            <a:pPr marL="342900" lvl="0" indent="-342900" algn="just">
+              <a:spcBef>
+                <a:spcPts val="900"/>
+              </a:spcBef>
+              <a:spcAft>
+                <a:spcPts val="400"/>
+              </a:spcAft>
+              <a:buFont typeface="+mj-lt"/>
+              <a:buAutoNum type="arabicPeriod"/>
+            </a:pPr>
             <a:r>
-              <a:rPr lang="en-US" dirty="0"/>
-              <a:t>Pellentesque habitant morbi tristique senectus et netus et malesuada fames ac turpis egestas. Proin pharetra nonummy pede. Mauris et orci.</a:t>
+              <a:rPr lang="en-US" sz="1100" b="0" dirty="0">
+                <a:effectLst/>
+                <a:ea typeface="Times New Roman" panose="02020603050405020304" pitchFamily="18" charset="0"/>
+              </a:rPr>
+              <a:t>Load the dataset </a:t>
             </a:r>
+            <a:r>
+              <a:rPr lang="en-US" sz="1100" b="0" i="1" dirty="0">
+                <a:effectLst/>
+                <a:ea typeface="Times New Roman" panose="02020603050405020304" pitchFamily="18" charset="0"/>
+              </a:rPr>
+              <a:t>points</a:t>
+            </a:r>
+            <a:endParaRPr lang="el-GR" sz="1100" b="1" dirty="0">
+              <a:effectLst/>
+              <a:ea typeface="Times New Roman" panose="02020603050405020304" pitchFamily="18" charset="0"/>
+            </a:endParaRPr>
           </a:p>
           <a:p>
-            <a:endParaRPr lang="en-US" dirty="0"/>
+            <a:pPr marL="342900" lvl="0" indent="-342900" algn="just">
+              <a:spcBef>
+                <a:spcPts val="900"/>
+              </a:spcBef>
+              <a:spcAft>
+                <a:spcPts val="400"/>
+              </a:spcAft>
+              <a:buFont typeface="+mj-lt"/>
+              <a:buAutoNum type="arabicPeriod"/>
+            </a:pPr>
+            <a:r>
+              <a:rPr lang="en-US" sz="1100" b="0" dirty="0">
+                <a:effectLst/>
+                <a:ea typeface="Times New Roman" panose="02020603050405020304" pitchFamily="18" charset="0"/>
+              </a:rPr>
+              <a:t>Compute the skyline set with the algorithm described on Task 1 given the dataset </a:t>
+            </a:r>
+            <a:r>
+              <a:rPr lang="en-US" sz="1100" b="0" i="1" dirty="0">
+                <a:effectLst/>
+                <a:ea typeface="Times New Roman" panose="02020603050405020304" pitchFamily="18" charset="0"/>
+              </a:rPr>
+              <a:t>points</a:t>
+            </a:r>
+            <a:endParaRPr lang="el-GR" sz="1100" b="1" dirty="0">
+              <a:effectLst/>
+              <a:ea typeface="Times New Roman" panose="02020603050405020304" pitchFamily="18" charset="0"/>
+            </a:endParaRPr>
           </a:p>
           <a:p>
-            <a:endParaRPr lang="en-US" dirty="0"/>
+            <a:pPr marL="342900" lvl="0" indent="-342900" algn="just">
+              <a:spcBef>
+                <a:spcPts val="900"/>
+              </a:spcBef>
+              <a:spcAft>
+                <a:spcPts val="400"/>
+              </a:spcAft>
+              <a:buFont typeface="+mj-lt"/>
+              <a:buAutoNum type="arabicPeriod"/>
+            </a:pPr>
+            <a:r>
+              <a:rPr lang="en-US" sz="1100" b="0" dirty="0">
+                <a:effectLst/>
+                <a:ea typeface="Times New Roman" panose="02020603050405020304" pitchFamily="18" charset="0"/>
+              </a:rPr>
+              <a:t>For each one of the skyline points, calculate the number of points they dominate</a:t>
+            </a:r>
+            <a:endParaRPr lang="el-GR" sz="1100" b="1" dirty="0">
+              <a:effectLst/>
+              <a:ea typeface="Times New Roman" panose="02020603050405020304" pitchFamily="18" charset="0"/>
+            </a:endParaRPr>
+          </a:p>
+          <a:p>
+            <a:pPr marL="342900" lvl="0" indent="-342900" algn="just">
+              <a:spcBef>
+                <a:spcPts val="900"/>
+              </a:spcBef>
+              <a:spcAft>
+                <a:spcPts val="400"/>
+              </a:spcAft>
+              <a:buFont typeface="+mj-lt"/>
+              <a:buAutoNum type="arabicPeriod"/>
+            </a:pPr>
+            <a:r>
+              <a:rPr lang="en-US" sz="1100" b="0" dirty="0">
+                <a:effectLst/>
+                <a:ea typeface="Times New Roman" panose="02020603050405020304" pitchFamily="18" charset="0"/>
+              </a:rPr>
+              <a:t>Create a list </a:t>
+            </a:r>
+            <a:r>
+              <a:rPr lang="en-US" sz="1100" b="0" i="1" dirty="0">
+                <a:effectLst/>
+                <a:ea typeface="Times New Roman" panose="02020603050405020304" pitchFamily="18" charset="0"/>
+              </a:rPr>
+              <a:t>candidate_points</a:t>
+            </a:r>
+            <a:r>
+              <a:rPr lang="en-US" sz="1100" b="0" dirty="0">
+                <a:effectLst/>
+                <a:ea typeface="Times New Roman" panose="02020603050405020304" pitchFamily="18" charset="0"/>
+              </a:rPr>
+              <a:t> of candidate top points that is initialized to be equal to the skyline set gathered at step 2 along with their number of dominations</a:t>
+            </a:r>
+            <a:endParaRPr lang="el-GR" sz="1100" b="1" dirty="0">
+              <a:effectLst/>
+              <a:ea typeface="Times New Roman" panose="02020603050405020304" pitchFamily="18" charset="0"/>
+            </a:endParaRPr>
+          </a:p>
+          <a:p>
+            <a:pPr marL="342900" lvl="0" indent="-342900" algn="just">
+              <a:spcBef>
+                <a:spcPts val="900"/>
+              </a:spcBef>
+              <a:spcAft>
+                <a:spcPts val="400"/>
+              </a:spcAft>
+              <a:buFont typeface="+mj-lt"/>
+              <a:buAutoNum type="arabicPeriod"/>
+            </a:pPr>
+            <a:r>
+              <a:rPr lang="en-US" sz="1100" b="0" dirty="0">
+                <a:effectLst/>
+                <a:ea typeface="Times New Roman" panose="02020603050405020304" pitchFamily="18" charset="0"/>
+              </a:rPr>
+              <a:t>Create an empty list </a:t>
+            </a:r>
+            <a:r>
+              <a:rPr lang="en-US" sz="1100" b="0" i="1" dirty="0">
+                <a:effectLst/>
+                <a:ea typeface="Times New Roman" panose="02020603050405020304" pitchFamily="18" charset="0"/>
+              </a:rPr>
+              <a:t>top_points</a:t>
+            </a:r>
+            <a:r>
+              <a:rPr lang="en-US" sz="1100" b="0" dirty="0">
+                <a:effectLst/>
+                <a:ea typeface="Times New Roman" panose="02020603050405020304" pitchFamily="18" charset="0"/>
+              </a:rPr>
+              <a:t> of the top k points</a:t>
+            </a:r>
+            <a:endParaRPr lang="el-GR" sz="1100" b="1" dirty="0">
+              <a:effectLst/>
+              <a:ea typeface="Times New Roman" panose="02020603050405020304" pitchFamily="18" charset="0"/>
+            </a:endParaRPr>
+          </a:p>
+          <a:p>
+            <a:pPr marL="342900" lvl="0" indent="-342900" algn="just">
+              <a:spcBef>
+                <a:spcPts val="900"/>
+              </a:spcBef>
+              <a:spcAft>
+                <a:spcPts val="400"/>
+              </a:spcAft>
+              <a:buFont typeface="+mj-lt"/>
+              <a:buAutoNum type="arabicPeriod"/>
+            </a:pPr>
+            <a:r>
+              <a:rPr lang="en-US" sz="1100" b="0" dirty="0">
+                <a:effectLst/>
+                <a:ea typeface="Times New Roman" panose="02020603050405020304" pitchFamily="18" charset="0"/>
+              </a:rPr>
+              <a:t>Sort the </a:t>
+            </a:r>
+            <a:r>
+              <a:rPr lang="en-US" sz="1100" b="0" i="1" dirty="0">
+                <a:effectLst/>
+                <a:ea typeface="Times New Roman" panose="02020603050405020304" pitchFamily="18" charset="0"/>
+              </a:rPr>
+              <a:t>candidate_points</a:t>
+            </a:r>
+            <a:r>
+              <a:rPr lang="en-US" sz="1100" b="0" dirty="0">
+                <a:effectLst/>
+                <a:ea typeface="Times New Roman" panose="02020603050405020304" pitchFamily="18" charset="0"/>
+              </a:rPr>
+              <a:t> list by the number of dominations in descending order</a:t>
+            </a:r>
+            <a:endParaRPr lang="el-GR" sz="1100" b="1" dirty="0">
+              <a:effectLst/>
+              <a:ea typeface="Times New Roman" panose="02020603050405020304" pitchFamily="18" charset="0"/>
+            </a:endParaRPr>
+          </a:p>
+          <a:p>
+            <a:pPr marL="342900" lvl="0" indent="-342900" algn="just">
+              <a:spcBef>
+                <a:spcPts val="900"/>
+              </a:spcBef>
+              <a:spcAft>
+                <a:spcPts val="400"/>
+              </a:spcAft>
+              <a:buFont typeface="+mj-lt"/>
+              <a:buAutoNum type="arabicPeriod"/>
+            </a:pPr>
+            <a:r>
+              <a:rPr lang="en-US" sz="1100" b="0" dirty="0">
+                <a:effectLst/>
+                <a:ea typeface="Times New Roman" panose="02020603050405020304" pitchFamily="18" charset="0"/>
+              </a:rPr>
+              <a:t>Get the first element </a:t>
+            </a:r>
+            <a:r>
+              <a:rPr lang="en-US" sz="1100" b="0" i="1" dirty="0">
+                <a:effectLst/>
+                <a:ea typeface="Times New Roman" panose="02020603050405020304" pitchFamily="18" charset="0"/>
+              </a:rPr>
+              <a:t>top_point</a:t>
+            </a:r>
+            <a:r>
+              <a:rPr lang="en-US" sz="1100" b="0" dirty="0">
+                <a:effectLst/>
+                <a:ea typeface="Times New Roman" panose="02020603050405020304" pitchFamily="18" charset="0"/>
+              </a:rPr>
+              <a:t> of the </a:t>
+            </a:r>
+            <a:r>
+              <a:rPr lang="en-US" sz="1100" b="0" i="1" dirty="0">
+                <a:effectLst/>
+                <a:ea typeface="Times New Roman" panose="02020603050405020304" pitchFamily="18" charset="0"/>
+              </a:rPr>
+              <a:t>candidate_points</a:t>
+            </a:r>
+            <a:r>
+              <a:rPr lang="en-US" sz="1100" b="0" dirty="0">
+                <a:effectLst/>
+                <a:ea typeface="Times New Roman" panose="02020603050405020304" pitchFamily="18" charset="0"/>
+              </a:rPr>
+              <a:t> list, add it to the </a:t>
+            </a:r>
+            <a:r>
+              <a:rPr lang="en-US" sz="1100" b="0" i="1" dirty="0">
+                <a:effectLst/>
+                <a:ea typeface="Times New Roman" panose="02020603050405020304" pitchFamily="18" charset="0"/>
+              </a:rPr>
+              <a:t>top_points</a:t>
+            </a:r>
+            <a:r>
+              <a:rPr lang="en-US" sz="1100" b="0" dirty="0">
+                <a:effectLst/>
+                <a:ea typeface="Times New Roman" panose="02020603050405020304" pitchFamily="18" charset="0"/>
+              </a:rPr>
+              <a:t> list and remove it from the dataset </a:t>
+            </a:r>
+            <a:r>
+              <a:rPr lang="en-US" sz="1100" b="0" i="1" dirty="0">
+                <a:effectLst/>
+                <a:ea typeface="Times New Roman" panose="02020603050405020304" pitchFamily="18" charset="0"/>
+              </a:rPr>
+              <a:t>points</a:t>
+            </a:r>
+            <a:endParaRPr lang="el-GR" sz="1100" b="1" dirty="0">
+              <a:effectLst/>
+              <a:ea typeface="Times New Roman" panose="02020603050405020304" pitchFamily="18" charset="0"/>
+            </a:endParaRPr>
+          </a:p>
+          <a:p>
+            <a:pPr marL="342900" lvl="0" indent="-342900" algn="just">
+              <a:spcBef>
+                <a:spcPts val="900"/>
+              </a:spcBef>
+              <a:spcAft>
+                <a:spcPts val="400"/>
+              </a:spcAft>
+              <a:buFont typeface="+mj-lt"/>
+              <a:buAutoNum type="arabicPeriod"/>
+            </a:pPr>
+            <a:r>
+              <a:rPr lang="en-US" sz="1100" b="0" dirty="0">
+                <a:effectLst/>
+                <a:ea typeface="Times New Roman" panose="02020603050405020304" pitchFamily="18" charset="0"/>
+              </a:rPr>
+              <a:t>Create a list </a:t>
+            </a:r>
+            <a:r>
+              <a:rPr lang="en-US" sz="1100" b="0" i="1" dirty="0">
+                <a:effectLst/>
+                <a:ea typeface="Times New Roman" panose="02020603050405020304" pitchFamily="18" charset="0"/>
+              </a:rPr>
+              <a:t>dominated_points</a:t>
+            </a:r>
+            <a:r>
+              <a:rPr lang="en-US" sz="1100" b="0" dirty="0">
+                <a:effectLst/>
+                <a:ea typeface="Times New Roman" panose="02020603050405020304" pitchFamily="18" charset="0"/>
+              </a:rPr>
+              <a:t> that contains all the points dominated by the </a:t>
+            </a:r>
+            <a:r>
+              <a:rPr lang="en-US" sz="1100" b="0" i="1" dirty="0">
+                <a:effectLst/>
+                <a:ea typeface="Times New Roman" panose="02020603050405020304" pitchFamily="18" charset="0"/>
+              </a:rPr>
+              <a:t>top_point</a:t>
+            </a:r>
+            <a:r>
+              <a:rPr lang="en-US" sz="1100" b="0" dirty="0">
+                <a:effectLst/>
+                <a:ea typeface="Times New Roman" panose="02020603050405020304" pitchFamily="18" charset="0"/>
+              </a:rPr>
+              <a:t> excluding itself and the points in the list </a:t>
+            </a:r>
+            <a:r>
+              <a:rPr lang="en-US" sz="1100" b="0" i="1" dirty="0">
+                <a:effectLst/>
+                <a:ea typeface="Times New Roman" panose="02020603050405020304" pitchFamily="18" charset="0"/>
+              </a:rPr>
+              <a:t>top_points</a:t>
+            </a:r>
+            <a:r>
+              <a:rPr lang="en-US" sz="1100" b="0" dirty="0">
+                <a:effectLst/>
+                <a:ea typeface="Times New Roman" panose="02020603050405020304" pitchFamily="18" charset="0"/>
+              </a:rPr>
+              <a:t>.</a:t>
+            </a:r>
+            <a:endParaRPr lang="el-GR" sz="1100" b="1" dirty="0">
+              <a:effectLst/>
+              <a:ea typeface="Times New Roman" panose="02020603050405020304" pitchFamily="18" charset="0"/>
+            </a:endParaRPr>
+          </a:p>
+          <a:p>
+            <a:pPr marL="342900" lvl="0" indent="-342900" algn="just">
+              <a:spcBef>
+                <a:spcPts val="900"/>
+              </a:spcBef>
+              <a:spcAft>
+                <a:spcPts val="400"/>
+              </a:spcAft>
+              <a:buFont typeface="+mj-lt"/>
+              <a:buAutoNum type="arabicPeriod"/>
+            </a:pPr>
+            <a:r>
+              <a:rPr lang="en-US" sz="1100" b="0" dirty="0">
+                <a:effectLst/>
+                <a:ea typeface="Times New Roman" panose="02020603050405020304" pitchFamily="18" charset="0"/>
+              </a:rPr>
+              <a:t>Compute the skyline points of the </a:t>
+            </a:r>
+            <a:r>
+              <a:rPr lang="en-US" sz="1100" b="0" i="1" dirty="0">
+                <a:effectLst/>
+                <a:ea typeface="Times New Roman" panose="02020603050405020304" pitchFamily="18" charset="0"/>
+              </a:rPr>
+              <a:t>dominated_points</a:t>
+            </a:r>
+            <a:r>
+              <a:rPr lang="en-US" sz="1100" b="0" dirty="0">
+                <a:effectLst/>
+                <a:ea typeface="Times New Roman" panose="02020603050405020304" pitchFamily="18" charset="0"/>
+              </a:rPr>
+              <a:t> list, using the algorithm described on task 1 and count the number of dominations for each one of them</a:t>
+            </a:r>
+            <a:endParaRPr lang="el-GR" sz="1100" b="1" dirty="0">
+              <a:effectLst/>
+              <a:ea typeface="Times New Roman" panose="02020603050405020304" pitchFamily="18" charset="0"/>
+            </a:endParaRPr>
+          </a:p>
+          <a:p>
+            <a:pPr marL="342900" lvl="0" indent="-342900" algn="just">
+              <a:spcBef>
+                <a:spcPts val="900"/>
+              </a:spcBef>
+              <a:spcAft>
+                <a:spcPts val="400"/>
+              </a:spcAft>
+              <a:buFont typeface="+mj-lt"/>
+              <a:buAutoNum type="arabicPeriod"/>
+            </a:pPr>
+            <a:r>
+              <a:rPr lang="en-US" sz="1100" b="0" dirty="0">
+                <a:effectLst/>
+                <a:ea typeface="Times New Roman" panose="02020603050405020304" pitchFamily="18" charset="0"/>
+              </a:rPr>
+              <a:t>Add the skylines points of the </a:t>
+            </a:r>
+            <a:r>
+              <a:rPr lang="en-US" sz="1100" b="0" i="1" dirty="0">
+                <a:effectLst/>
+                <a:ea typeface="Times New Roman" panose="02020603050405020304" pitchFamily="18" charset="0"/>
+              </a:rPr>
+              <a:t>dominated_points </a:t>
+            </a:r>
+            <a:r>
+              <a:rPr lang="en-US" sz="1100" b="0" dirty="0">
+                <a:effectLst/>
+                <a:ea typeface="Times New Roman" panose="02020603050405020304" pitchFamily="18" charset="0"/>
+              </a:rPr>
+              <a:t>list along with their dominations in the </a:t>
+            </a:r>
+            <a:r>
+              <a:rPr lang="en-US" sz="1100" b="0" i="1" dirty="0">
+                <a:effectLst/>
+                <a:ea typeface="Times New Roman" panose="02020603050405020304" pitchFamily="18" charset="0"/>
+              </a:rPr>
+              <a:t>candidate_points</a:t>
+            </a:r>
+            <a:r>
+              <a:rPr lang="en-US" sz="1100" b="0" dirty="0">
+                <a:effectLst/>
+                <a:ea typeface="Times New Roman" panose="02020603050405020304" pitchFamily="18" charset="0"/>
+              </a:rPr>
+              <a:t> list</a:t>
+            </a:r>
+            <a:endParaRPr lang="el-GR" sz="1100" b="1" dirty="0">
+              <a:effectLst/>
+              <a:ea typeface="Times New Roman" panose="02020603050405020304" pitchFamily="18" charset="0"/>
+            </a:endParaRPr>
+          </a:p>
+          <a:p>
+            <a:pPr marL="342900" lvl="0" indent="-342900" algn="just">
+              <a:spcBef>
+                <a:spcPts val="900"/>
+              </a:spcBef>
+              <a:spcAft>
+                <a:spcPts val="400"/>
+              </a:spcAft>
+              <a:buFont typeface="+mj-lt"/>
+              <a:buAutoNum type="arabicPeriod"/>
+            </a:pPr>
+            <a:r>
+              <a:rPr lang="en-US" sz="1100" b="0" dirty="0">
+                <a:effectLst/>
+                <a:ea typeface="Times New Roman" panose="02020603050405020304" pitchFamily="18" charset="0"/>
+              </a:rPr>
+              <a:t>If the length of the </a:t>
+            </a:r>
+            <a:r>
+              <a:rPr lang="en-US" sz="1100" b="0" i="1" dirty="0">
+                <a:effectLst/>
+                <a:ea typeface="Times New Roman" panose="02020603050405020304" pitchFamily="18" charset="0"/>
+              </a:rPr>
+              <a:t>candidate_points</a:t>
+            </a:r>
+            <a:r>
+              <a:rPr lang="en-US" sz="1100" b="0" dirty="0">
+                <a:effectLst/>
+                <a:ea typeface="Times New Roman" panose="02020603050405020304" pitchFamily="18" charset="0"/>
+              </a:rPr>
+              <a:t> list is zero or we got the top k points then return </a:t>
+            </a:r>
+            <a:r>
+              <a:rPr lang="en-US" sz="1100" b="0" i="1" dirty="0">
+                <a:effectLst/>
+                <a:ea typeface="Times New Roman" panose="02020603050405020304" pitchFamily="18" charset="0"/>
+              </a:rPr>
+              <a:t>top_points</a:t>
+            </a:r>
+            <a:r>
+              <a:rPr lang="en-US" sz="1100" b="0" dirty="0">
+                <a:effectLst/>
+                <a:ea typeface="Times New Roman" panose="02020603050405020304" pitchFamily="18" charset="0"/>
+              </a:rPr>
+              <a:t> list else go to step 6</a:t>
+            </a:r>
+            <a:endParaRPr lang="el-GR" sz="1100" b="1" dirty="0">
+              <a:effectLst/>
+              <a:ea typeface="Times New Roman" panose="02020603050405020304" pitchFamily="18" charset="0"/>
+            </a:endParaRPr>
           </a:p>
         </p:txBody>
       </p:sp>
@@ -32045,10 +34829,10 @@
       </p:grpSpPr>
       <p:sp>
         <p:nvSpPr>
-          <p:cNvPr id="4" name="Title 3">
+          <p:cNvPr id="2" name="Τίτλος 1">
             <a:extLst>
               <a:ext uri="{FF2B5EF4-FFF2-40B4-BE49-F238E27FC236}">
-                <a16:creationId xmlns:a16="http://schemas.microsoft.com/office/drawing/2014/main" id="{315E3981-F0D7-482C-A8E0-6A57700BECA7}"/>
+                <a16:creationId xmlns:a16="http://schemas.microsoft.com/office/drawing/2014/main" id="{A6F23DA2-8C28-CC7D-B19C-5A54995DFB0A}"/>
               </a:ext>
             </a:extLst>
           </p:cNvPr>
@@ -32059,24 +34843,30 @@
             <p:ph type="title"/>
           </p:nvPr>
         </p:nvSpPr>
-        <p:spPr/>
+        <p:spPr>
+          <a:xfrm>
+            <a:off x="444500" y="542925"/>
+            <a:ext cx="11214100" cy="535531"/>
+          </a:xfrm>
+        </p:spPr>
         <p:txBody>
           <a:bodyPr/>
           <a:lstStyle/>
           <a:p>
             <a:r>
               <a:rPr lang="en-US" dirty="0"/>
-              <a:t>Task 2</a:t>
+              <a:t>Top 2 points example</a:t>
             </a:r>
+            <a:endParaRPr lang="el-GR" dirty="0"/>
           </a:p>
         </p:txBody>
       </p:sp>
       <p:sp>
         <p:nvSpPr>
-          <p:cNvPr id="2" name="Slide Number Placeholder 1">
+          <p:cNvPr id="3" name="Θέση αριθμού διαφάνειας 2">
             <a:extLst>
               <a:ext uri="{FF2B5EF4-FFF2-40B4-BE49-F238E27FC236}">
-                <a16:creationId xmlns:a16="http://schemas.microsoft.com/office/drawing/2014/main" id="{520FC4EE-F318-4344-9E3C-B950ADB63865}"/>
+                <a16:creationId xmlns:a16="http://schemas.microsoft.com/office/drawing/2014/main" id="{D641B237-C610-F2A4-99F9-5C44C21A7B66}"/>
               </a:ext>
             </a:extLst>
           </p:cNvPr>
@@ -32093,169 +34883,300 @@
           <a:lstStyle/>
           <a:p>
             <a:fld id="{C263D6C4-4840-40CC-AC84-17E24B3B7BDE}" type="slidenum">
-              <a:rPr lang="en-US" smtClean="0"/>
+              <a:rPr lang="en-US" noProof="0" smtClean="0"/>
               <a:pPr/>
               <a:t>9</a:t>
             </a:fld>
-            <a:endParaRPr lang="en-US" dirty="0"/>
+            <a:endParaRPr lang="en-US" noProof="0" dirty="0"/>
           </a:p>
         </p:txBody>
       </p:sp>
-      <p:sp>
-        <p:nvSpPr>
-          <p:cNvPr id="7" name="Text Placeholder 6">
+      <p:pic>
+        <p:nvPicPr>
+          <p:cNvPr id="9" name="Εικόνα 8">
             <a:extLst>
               <a:ext uri="{FF2B5EF4-FFF2-40B4-BE49-F238E27FC236}">
-                <a16:creationId xmlns:a16="http://schemas.microsoft.com/office/drawing/2014/main" id="{B74126B4-1E6C-4FFF-9282-40E18A85A07F}"/>
+                <a16:creationId xmlns:a16="http://schemas.microsoft.com/office/drawing/2014/main" id="{0D157B8C-BFA1-28D7-B5FE-ACD766EC772A}"/>
               </a:ext>
             </a:extLst>
           </p:cNvPr>
-          <p:cNvSpPr>
-            <a:spLocks noGrp="1"/>
-          </p:cNvSpPr>
-          <p:nvPr>
-            <p:ph type="body" sz="quarter" idx="1"/>
-          </p:nvPr>
-        </p:nvSpPr>
-        <p:spPr/>
-        <p:txBody>
-          <a:bodyPr/>
-          <a:lstStyle/>
-          <a:p>
-            <a:r>
-              <a:rPr lang="en-US" dirty="0"/>
-              <a:t>Lorem ipsum dolor sit amet</a:t>
-            </a:r>
-          </a:p>
-        </p:txBody>
-      </p:sp>
+          <p:cNvPicPr>
+            <a:picLocks noChangeAspect="1"/>
+          </p:cNvPicPr>
+          <p:nvPr/>
+        </p:nvPicPr>
+        <p:blipFill>
+          <a:blip r:embed="rId2"/>
+          <a:stretch>
+            <a:fillRect/>
+          </a:stretch>
+        </p:blipFill>
+        <p:spPr>
+          <a:xfrm>
+            <a:off x="444500" y="1350793"/>
+            <a:ext cx="6703358" cy="5433248"/>
+          </a:xfrm>
+          <a:prstGeom prst="rect">
+            <a:avLst/>
+          </a:prstGeom>
+        </p:spPr>
+      </p:pic>
       <p:sp>
         <p:nvSpPr>
-          <p:cNvPr id="5" name="Text Placeholder 4">
+          <p:cNvPr id="10" name="TextBox 9">
             <a:extLst>
               <a:ext uri="{FF2B5EF4-FFF2-40B4-BE49-F238E27FC236}">
-                <a16:creationId xmlns:a16="http://schemas.microsoft.com/office/drawing/2014/main" id="{E0C87788-476B-4620-8002-A5C1177AD6C1}"/>
+                <a16:creationId xmlns:a16="http://schemas.microsoft.com/office/drawing/2014/main" id="{9CEF2B1F-6A04-E030-3B9B-D56E893BAF76}"/>
               </a:ext>
             </a:extLst>
           </p:cNvPr>
-          <p:cNvSpPr>
-            <a:spLocks noGrp="1"/>
-          </p:cNvSpPr>
-          <p:nvPr>
-            <p:ph type="body" sz="quarter" idx="3"/>
-          </p:nvPr>
+          <p:cNvSpPr txBox="1"/>
+          <p:nvPr/>
         </p:nvSpPr>
-        <p:spPr/>
+        <p:spPr>
+          <a:xfrm>
+            <a:off x="7371228" y="1693690"/>
+            <a:ext cx="4587690" cy="4637167"/>
+          </a:xfrm>
+          <a:prstGeom prst="rect">
+            <a:avLst/>
+          </a:prstGeom>
+          <a:noFill/>
+        </p:spPr>
         <p:txBody>
-          <a:bodyPr/>
+          <a:bodyPr wrap="square" rtlCol="0">
+            <a:spAutoFit/>
+          </a:bodyPr>
           <a:lstStyle/>
           <a:p>
+            <a:pPr marL="342900" indent="-342900" algn="just">
+              <a:spcBef>
+                <a:spcPts val="900"/>
+              </a:spcBef>
+              <a:spcAft>
+                <a:spcPts val="400"/>
+              </a:spcAft>
+              <a:buFont typeface="+mj-lt"/>
+              <a:buAutoNum type="arabicPeriod"/>
+            </a:pPr>
             <a:r>
-              <a:rPr lang="en-US" dirty="0"/>
-              <a:t>Lorem ipsum dolor sit amet</a:t>
+              <a:rPr lang="en-US" sz="1800" b="0" dirty="0">
+                <a:solidFill>
+                  <a:schemeClr val="bg1"/>
+                </a:solidFill>
+                <a:effectLst/>
+                <a:ea typeface="Times New Roman" panose="02020603050405020304" pitchFamily="18" charset="0"/>
+              </a:rPr>
+              <a:t>Load the dataset </a:t>
             </a:r>
+            <a:r>
+              <a:rPr lang="en-US" sz="1800" b="0" i="1" dirty="0">
+                <a:solidFill>
+                  <a:schemeClr val="bg1"/>
+                </a:solidFill>
+                <a:effectLst/>
+                <a:ea typeface="Times New Roman" panose="02020603050405020304" pitchFamily="18" charset="0"/>
+              </a:rPr>
+              <a:t>points</a:t>
+            </a:r>
+            <a:endParaRPr lang="en-US" sz="1800" b="0" dirty="0">
+              <a:solidFill>
+                <a:schemeClr val="bg1"/>
+              </a:solidFill>
+              <a:effectLst/>
+              <a:ea typeface="Times New Roman" panose="02020603050405020304" pitchFamily="18" charset="0"/>
+            </a:endParaRPr>
           </a:p>
-        </p:txBody>
-      </p:sp>
-      <p:sp>
-        <p:nvSpPr>
-          <p:cNvPr id="8" name="Text Placeholder 7">
-            <a:extLst>
-              <a:ext uri="{FF2B5EF4-FFF2-40B4-BE49-F238E27FC236}">
-                <a16:creationId xmlns:a16="http://schemas.microsoft.com/office/drawing/2014/main" id="{47DC4E62-1A34-4F98-A451-214F1808519C}"/>
-              </a:ext>
-            </a:extLst>
-          </p:cNvPr>
-          <p:cNvSpPr>
-            <a:spLocks noGrp="1"/>
-          </p:cNvSpPr>
-          <p:nvPr>
-            <p:ph type="body" sz="quarter" idx="2"/>
-          </p:nvPr>
-        </p:nvSpPr>
-        <p:spPr/>
-        <p:txBody>
-          <a:bodyPr/>
-          <a:lstStyle/>
           <a:p>
+            <a:pPr marL="342900" lvl="0" indent="-342900" algn="just">
+              <a:spcBef>
+                <a:spcPts val="900"/>
+              </a:spcBef>
+              <a:spcAft>
+                <a:spcPts val="400"/>
+              </a:spcAft>
+              <a:buFont typeface="+mj-lt"/>
+              <a:buAutoNum type="arabicPeriod"/>
+            </a:pPr>
             <a:r>
-              <a:rPr lang="en-US" dirty="0"/>
-              <a:t>Lorem ipsum dolor sit amet, consectetuer adipiscing elit. Maecenas porttitor congue massa. Fusce posuere, magna sed pulvinar ultricies, purus lectus malesuada libero, sit amet commodo magna eros quis urna. Nunc viverra imperdiet enim. Fusce est. Vivamus a tellus.</a:t>
+              <a:rPr lang="en-US" sz="1800" b="0" dirty="0">
+                <a:solidFill>
+                  <a:schemeClr val="bg1"/>
+                </a:solidFill>
+                <a:effectLst/>
+                <a:ea typeface="Times New Roman" panose="02020603050405020304" pitchFamily="18" charset="0"/>
+              </a:rPr>
+              <a:t>Compute the skyline set with the algorithm described on Task 1 given the dataset </a:t>
+            </a:r>
+            <a:r>
+              <a:rPr lang="en-US" sz="1800" b="0" i="1" dirty="0">
+                <a:solidFill>
+                  <a:schemeClr val="bg1"/>
+                </a:solidFill>
+                <a:effectLst/>
+                <a:ea typeface="Times New Roman" panose="02020603050405020304" pitchFamily="18" charset="0"/>
+              </a:rPr>
+              <a:t>points</a:t>
+            </a:r>
+            <a:endParaRPr lang="el-GR" sz="1800" b="1" dirty="0">
+              <a:solidFill>
+                <a:schemeClr val="bg1"/>
+              </a:solidFill>
+              <a:effectLst/>
+              <a:ea typeface="Times New Roman" panose="02020603050405020304" pitchFamily="18" charset="0"/>
+            </a:endParaRPr>
+          </a:p>
+          <a:p>
+            <a:pPr marL="342900" lvl="0" indent="-342900" algn="just">
+              <a:spcBef>
+                <a:spcPts val="900"/>
+              </a:spcBef>
+              <a:spcAft>
+                <a:spcPts val="400"/>
+              </a:spcAft>
+              <a:buFont typeface="+mj-lt"/>
+              <a:buAutoNum type="arabicPeriod"/>
+            </a:pPr>
+            <a:r>
+              <a:rPr lang="en-US" sz="1800" b="0" dirty="0">
+                <a:solidFill>
+                  <a:schemeClr val="bg1"/>
+                </a:solidFill>
+                <a:effectLst/>
+                <a:ea typeface="Times New Roman" panose="02020603050405020304" pitchFamily="18" charset="0"/>
+              </a:rPr>
+              <a:t>For each one of the skyline points, calculate the number of points they dominate</a:t>
             </a:r>
           </a:p>
           <a:p>
+            <a:pPr marL="342900" indent="-342900" algn="just">
+              <a:spcBef>
+                <a:spcPts val="900"/>
+              </a:spcBef>
+              <a:spcAft>
+                <a:spcPts val="400"/>
+              </a:spcAft>
+              <a:buFont typeface="+mj-lt"/>
+              <a:buAutoNum type="arabicPeriod"/>
+            </a:pPr>
             <a:r>
-              <a:rPr lang="en-US" dirty="0"/>
-              <a:t>Pellentesque habitant morbi tristique senectus et netus et malesuada fames ac turpis egestas. Proin pharetra nonummy pede. Mauris et orci.</a:t>
+              <a:rPr lang="en-US" sz="1800" b="0" dirty="0">
+                <a:solidFill>
+                  <a:schemeClr val="bg1"/>
+                </a:solidFill>
+                <a:effectLst/>
+                <a:ea typeface="Times New Roman" panose="02020603050405020304" pitchFamily="18" charset="0"/>
+              </a:rPr>
+              <a:t>Create a list </a:t>
+            </a:r>
+            <a:r>
+              <a:rPr lang="en-US" sz="1800" b="0" i="1" dirty="0">
+                <a:solidFill>
+                  <a:schemeClr val="accent1">
+                    <a:lumMod val="40000"/>
+                    <a:lumOff val="60000"/>
+                  </a:schemeClr>
+                </a:solidFill>
+                <a:effectLst/>
+                <a:ea typeface="Times New Roman" panose="02020603050405020304" pitchFamily="18" charset="0"/>
+              </a:rPr>
+              <a:t>candidate_points </a:t>
+            </a:r>
+            <a:r>
+              <a:rPr lang="en-US" sz="1800" b="0" dirty="0">
+                <a:solidFill>
+                  <a:schemeClr val="accent1">
+                    <a:lumMod val="40000"/>
+                    <a:lumOff val="60000"/>
+                  </a:schemeClr>
+                </a:solidFill>
+                <a:effectLst/>
+                <a:ea typeface="Times New Roman" panose="02020603050405020304" pitchFamily="18" charset="0"/>
+              </a:rPr>
+              <a:t>(blue points) </a:t>
+            </a:r>
+            <a:r>
+              <a:rPr lang="en-US" sz="1800" b="0" dirty="0">
+                <a:solidFill>
+                  <a:schemeClr val="bg1"/>
+                </a:solidFill>
+                <a:effectLst/>
+                <a:ea typeface="Times New Roman" panose="02020603050405020304" pitchFamily="18" charset="0"/>
+              </a:rPr>
+              <a:t>of candidate top points that is initialized to be equal to the skyline set gathered at step 2 along with their number of dominations</a:t>
             </a:r>
           </a:p>
           <a:p>
-            <a:endParaRPr lang="en-US" dirty="0"/>
-          </a:p>
-          <a:p>
-            <a:endParaRPr lang="en-US" dirty="0"/>
-          </a:p>
-        </p:txBody>
-      </p:sp>
-      <p:sp>
-        <p:nvSpPr>
-          <p:cNvPr id="6" name="Text Placeholder 5">
-            <a:extLst>
-              <a:ext uri="{FF2B5EF4-FFF2-40B4-BE49-F238E27FC236}">
-                <a16:creationId xmlns:a16="http://schemas.microsoft.com/office/drawing/2014/main" id="{000A9570-5EF6-4AFB-9FCA-7C8998E3FEB1}"/>
-              </a:ext>
-            </a:extLst>
-          </p:cNvPr>
-          <p:cNvSpPr>
-            <a:spLocks noGrp="1"/>
-          </p:cNvSpPr>
-          <p:nvPr>
-            <p:ph type="body" sz="quarter" idx="4"/>
-          </p:nvPr>
-        </p:nvSpPr>
-        <p:spPr/>
-        <p:txBody>
-          <a:bodyPr/>
-          <a:lstStyle/>
-          <a:p>
+            <a:pPr marL="342900" indent="-342900" algn="just">
+              <a:spcBef>
+                <a:spcPts val="900"/>
+              </a:spcBef>
+              <a:spcAft>
+                <a:spcPts val="400"/>
+              </a:spcAft>
+              <a:buFont typeface="+mj-lt"/>
+              <a:buAutoNum type="arabicPeriod"/>
+            </a:pPr>
             <a:r>
-              <a:rPr lang="en-US" dirty="0"/>
-              <a:t>Lorem ipsum dolor sit amet, consectetuer adipiscing elit. Maecenas porttitor congue massa. Fusce posuere, magna sed pulvinar ultricies, purus lectus malesuada libero, sit amet commodo magna eros quis urna. Nunc viverra imperdiet enim. Fusce est. Vivamus a tellus.</a:t>
+              <a:rPr lang="en-US" sz="1800" b="0" dirty="0">
+                <a:solidFill>
+                  <a:schemeClr val="bg1"/>
+                </a:solidFill>
+                <a:effectLst/>
+                <a:ea typeface="Times New Roman" panose="02020603050405020304" pitchFamily="18" charset="0"/>
+              </a:rPr>
+              <a:t>Create an empty list </a:t>
             </a:r>
-          </a:p>
-          <a:p>
             <a:r>
-              <a:rPr lang="en-US" dirty="0"/>
-              <a:t>Pellentesque habitant morbi tristique senectus et netus et malesuada fames ac turpis egestas. Proin pharetra nonummy pede. Mauris et orci.</a:t>
+              <a:rPr lang="en-US" sz="1800" b="0" i="1" dirty="0">
+                <a:solidFill>
+                  <a:srgbClr val="92D050"/>
+                </a:solidFill>
+                <a:effectLst/>
+                <a:ea typeface="Times New Roman" panose="02020603050405020304" pitchFamily="18" charset="0"/>
+              </a:rPr>
+              <a:t>top_points (green points)</a:t>
             </a:r>
-          </a:p>
-          <a:p>
-            <a:endParaRPr lang="en-US" dirty="0"/>
+            <a:r>
+              <a:rPr lang="en-US" sz="1800" b="0" dirty="0">
+                <a:solidFill>
+                  <a:srgbClr val="92D050"/>
+                </a:solidFill>
+                <a:effectLst/>
+                <a:ea typeface="Times New Roman" panose="02020603050405020304" pitchFamily="18" charset="0"/>
+              </a:rPr>
+              <a:t> </a:t>
+            </a:r>
+            <a:r>
+              <a:rPr lang="en-US" sz="1800" b="0" dirty="0">
+                <a:solidFill>
+                  <a:schemeClr val="bg1"/>
+                </a:solidFill>
+                <a:effectLst/>
+                <a:ea typeface="Times New Roman" panose="02020603050405020304" pitchFamily="18" charset="0"/>
+              </a:rPr>
+              <a:t>of the top k points</a:t>
+            </a:r>
+            <a:endParaRPr lang="el-GR" sz="1800" b="1" dirty="0">
+              <a:solidFill>
+                <a:schemeClr val="bg1"/>
+              </a:solidFill>
+              <a:effectLst/>
+              <a:ea typeface="Times New Roman" panose="02020603050405020304" pitchFamily="18" charset="0"/>
+            </a:endParaRPr>
           </a:p>
         </p:txBody>
       </p:sp>
     </p:spTree>
     <p:extLst>
       <p:ext uri="{BB962C8B-B14F-4D97-AF65-F5344CB8AC3E}">
-        <p14:creationId xmlns:p14="http://schemas.microsoft.com/office/powerpoint/2010/main" val="458156879"/>
+        <p14:creationId xmlns:p14="http://schemas.microsoft.com/office/powerpoint/2010/main" val="3520210473"/>
       </p:ext>
     </p:extLst>
   </p:cSld>
   <p:clrMapOvr>
     <a:masterClrMapping/>
   </p:clrMapOvr>
-  <mc:AlternateContent xmlns:mc="http://schemas.openxmlformats.org/markup-compatibility/2006" xmlns:p14="http://schemas.microsoft.com/office/powerpoint/2010/main">
-    <mc:Choice Requires="p14">
-      <p:transition spd="med" p14:dur="700">
-        <p:fade/>
-      </p:transition>
-    </mc:Choice>
-    <mc:Fallback xmlns="">
-      <p:transition spd="med">
-        <p:fade/>
-      </p:transition>
-    </mc:Fallback>
-  </mc:AlternateContent>
 </p:sld>
 </file>
 
@@ -33051,6 +35972,14 @@
 </file>
 
 <file path=customXml/item1.xml><?xml version="1.0" encoding="utf-8"?>
+<p:properties xmlns:p="http://schemas.microsoft.com/office/2006/metadata/properties" xmlns:xsi="http://www.w3.org/2001/XMLSchema-instance" xmlns:pc="http://schemas.microsoft.com/office/infopath/2007/PartnerControls">
+  <documentManagement>
+    <MediaServiceKeyPoints xmlns="71af3243-3dd4-4a8d-8c0d-dd76da1f02a5" xsi:nil="true"/>
+  </documentManagement>
+</p:properties>
+</file>
+
+<file path=customXml/item2.xml><?xml version="1.0" encoding="utf-8"?>
 <ct:contentTypeSchema xmlns:ct="http://schemas.microsoft.com/office/2006/metadata/contentType" xmlns:ma="http://schemas.microsoft.com/office/2006/metadata/properties/metaAttributes" ct:_="" ma:_="" ma:contentTypeName="Document" ma:contentTypeID="0x01010079F111ED35F8CC479449609E8A0923A6" ma:contentTypeVersion="11" ma:contentTypeDescription="Create a new document." ma:contentTypeScope="" ma:versionID="96291512c1ee715ab617f4c07df79fc1">
   <xsd:schema xmlns:xsd="http://www.w3.org/2001/XMLSchema" xmlns:xs="http://www.w3.org/2001/XMLSchema" xmlns:p="http://schemas.microsoft.com/office/2006/metadata/properties" xmlns:ns2="71af3243-3dd4-4a8d-8c0d-dd76da1f02a5" xmlns:ns3="16c05727-aa75-4e4a-9b5f-8a80a1165891" targetNamespace="http://schemas.microsoft.com/office/2006/metadata/properties" ma:root="true" ma:fieldsID="8256c27c40ca5c40ce1cf6c44f0205df" ns2:_="" ns3:_="">
     <xsd:import namespace="71af3243-3dd4-4a8d-8c0d-dd76da1f02a5"/>
@@ -33261,14 +36190,6 @@
 </ct:contentTypeSchema>
 </file>
 
-<file path=customXml/item2.xml><?xml version="1.0" encoding="utf-8"?>
-<p:properties xmlns:p="http://schemas.microsoft.com/office/2006/metadata/properties" xmlns:xsi="http://www.w3.org/2001/XMLSchema-instance" xmlns:pc="http://schemas.microsoft.com/office/infopath/2007/PartnerControls">
-  <documentManagement>
-    <MediaServiceKeyPoints xmlns="71af3243-3dd4-4a8d-8c0d-dd76da1f02a5" xsi:nil="true"/>
-  </documentManagement>
-</p:properties>
-</file>
-
 <file path=customXml/item3.xml><?xml version="1.0" encoding="utf-8"?>
 <?mso-contentType ?>
 <FormTemplates xmlns="http://schemas.microsoft.com/sharepoint/v3/contenttype/forms">
@@ -33279,6 +36200,23 @@
 </file>
 
 <file path=customXml/itemProps1.xml><?xml version="1.0" encoding="utf-8"?>
+<ds:datastoreItem xmlns:ds="http://schemas.openxmlformats.org/officeDocument/2006/customXml" ds:itemID="{F5757914-1161-4661-9696-421FD6935CDD}">
+  <ds:schemaRefs>
+    <ds:schemaRef ds:uri="http://schemas.microsoft.com/office/2006/documentManagement/types"/>
+    <ds:schemaRef ds:uri="http://schemas.microsoft.com/office/infopath/2007/PartnerControls"/>
+    <ds:schemaRef ds:uri="http://purl.org/dc/terms/"/>
+    <ds:schemaRef ds:uri="http://purl.org/dc/dcmitype/"/>
+    <ds:schemaRef ds:uri="16c05727-aa75-4e4a-9b5f-8a80a1165891"/>
+    <ds:schemaRef ds:uri="http://www.w3.org/XML/1998/namespace"/>
+    <ds:schemaRef ds:uri="71af3243-3dd4-4a8d-8c0d-dd76da1f02a5"/>
+    <ds:schemaRef ds:uri="http://schemas.openxmlformats.org/package/2006/metadata/core-properties"/>
+    <ds:schemaRef ds:uri="http://schemas.microsoft.com/office/2006/metadata/properties"/>
+    <ds:schemaRef ds:uri="http://purl.org/dc/elements/1.1/"/>
+  </ds:schemaRefs>
+</ds:datastoreItem>
+</file>
+
+<file path=customXml/itemProps2.xml><?xml version="1.0" encoding="utf-8"?>
 <ds:datastoreItem xmlns:ds="http://schemas.openxmlformats.org/officeDocument/2006/customXml" ds:itemID="{4C103400-4A22-4E35-B588-4C4D42638959}">
   <ds:schemaRefs>
     <ds:schemaRef ds:uri="http://schemas.microsoft.com/office/2006/metadata/contentType"/>
@@ -33297,23 +36235,6 @@
 </ds:datastoreItem>
 </file>
 
-<file path=customXml/itemProps2.xml><?xml version="1.0" encoding="utf-8"?>
-<ds:datastoreItem xmlns:ds="http://schemas.openxmlformats.org/officeDocument/2006/customXml" ds:itemID="{F5757914-1161-4661-9696-421FD6935CDD}">
-  <ds:schemaRefs>
-    <ds:schemaRef ds:uri="http://schemas.microsoft.com/office/2006/documentManagement/types"/>
-    <ds:schemaRef ds:uri="http://schemas.microsoft.com/office/infopath/2007/PartnerControls"/>
-    <ds:schemaRef ds:uri="http://purl.org/dc/terms/"/>
-    <ds:schemaRef ds:uri="http://purl.org/dc/dcmitype/"/>
-    <ds:schemaRef ds:uri="16c05727-aa75-4e4a-9b5f-8a80a1165891"/>
-    <ds:schemaRef ds:uri="http://www.w3.org/XML/1998/namespace"/>
-    <ds:schemaRef ds:uri="71af3243-3dd4-4a8d-8c0d-dd76da1f02a5"/>
-    <ds:schemaRef ds:uri="http://schemas.openxmlformats.org/package/2006/metadata/core-properties"/>
-    <ds:schemaRef ds:uri="http://schemas.microsoft.com/office/2006/metadata/properties"/>
-    <ds:schemaRef ds:uri="http://purl.org/dc/elements/1.1/"/>
-  </ds:schemaRefs>
-</ds:datastoreItem>
-</file>
-
 <file path=customXml/itemProps3.xml><?xml version="1.0" encoding="utf-8"?>
 <ds:datastoreItem xmlns:ds="http://schemas.openxmlformats.org/officeDocument/2006/customXml" ds:itemID="{5B26E0C9-B2AA-42E6-97B6-E1B7D9EAF129}">
   <ds:schemaRefs>

</xml_diff>